<commit_message>
fixed broken score function, added new function for checking missing rows, and improved row filler function to do everythin in one step
</commit_message>
<xml_diff>
--- a/report figures/Report Figures.pptx
+++ b/report figures/Report Figures.pptx
@@ -6,6 +6,7 @@
   </p:sldMasterIdLst>
   <p:sldIdLst>
     <p:sldId id="256" r:id="rId2"/>
+    <p:sldId id="257" r:id="rId3"/>
   </p:sldIdLst>
   <p:sldSz cx="9144000" cy="5778500"/>
   <p:notesSz cx="6858000" cy="9144000"/>
@@ -104,6 +105,11 @@
       </a:defRPr>
     </a:lvl9pPr>
   </p:defaultTextStyle>
+  <p:extLst>
+    <p:ext uri="{EFAFB233-063F-42B5-8137-9DF3F51BA10A}">
+      <p15:sldGuideLst xmlns:p15="http://schemas.microsoft.com/office/powerpoint/2012/main"/>
+    </p:ext>
+  </p:extLst>
 </p:presentation>
 </file>
 
@@ -3377,6 +3383,1623 @@
 </p:sld>
 </file>
 
+<file path=ppt/slides/slide2.xml><?xml version="1.0" encoding="utf-8"?>
+<p:sld xmlns:a="http://schemas.openxmlformats.org/drawingml/2006/main" xmlns:r="http://schemas.openxmlformats.org/officeDocument/2006/relationships" xmlns:p="http://schemas.openxmlformats.org/presentationml/2006/main">
+  <p:cSld>
+    <p:spTree>
+      <p:nvGrpSpPr>
+        <p:cNvPr id="1" name=""/>
+        <p:cNvGrpSpPr/>
+        <p:nvPr/>
+      </p:nvGrpSpPr>
+      <p:grpSpPr>
+        <a:xfrm>
+          <a:off x="0" y="0"/>
+          <a:ext cx="0" cy="0"/>
+          <a:chOff x="0" y="0"/>
+          <a:chExt cx="0" cy="0"/>
+        </a:xfrm>
+      </p:grpSpPr>
+      <p:grpSp>
+        <p:nvGrpSpPr>
+          <p:cNvPr id="111" name="Group 110">
+            <a:extLst>
+              <a:ext uri="{FF2B5EF4-FFF2-40B4-BE49-F238E27FC236}">
+                <a16:creationId xmlns:a16="http://schemas.microsoft.com/office/drawing/2014/main" id="{AAA80B8A-7137-4D27-8837-198F5E0B42F7}"/>
+              </a:ext>
+            </a:extLst>
+          </p:cNvPr>
+          <p:cNvGrpSpPr/>
+          <p:nvPr/>
+        </p:nvGrpSpPr>
+        <p:grpSpPr>
+          <a:xfrm>
+            <a:off x="0" y="148169"/>
+            <a:ext cx="8180971" cy="5482161"/>
+            <a:chOff x="632443" y="274396"/>
+            <a:chExt cx="8180971" cy="5482161"/>
+          </a:xfrm>
+        </p:grpSpPr>
+        <p:grpSp>
+          <p:nvGrpSpPr>
+            <p:cNvPr id="44" name="Group 43">
+              <a:extLst>
+                <a:ext uri="{FF2B5EF4-FFF2-40B4-BE49-F238E27FC236}">
+                  <a16:creationId xmlns:a16="http://schemas.microsoft.com/office/drawing/2014/main" id="{C3EB0A3D-BF6D-4991-B9CF-51D53C31146A}"/>
+                </a:ext>
+              </a:extLst>
+            </p:cNvPr>
+            <p:cNvGrpSpPr/>
+            <p:nvPr/>
+          </p:nvGrpSpPr>
+          <p:grpSpPr>
+            <a:xfrm>
+              <a:off x="3266957" y="307730"/>
+              <a:ext cx="2659615" cy="5387867"/>
+              <a:chOff x="394314" y="307741"/>
+              <a:chExt cx="2659615" cy="5387867"/>
+            </a:xfrm>
+          </p:grpSpPr>
+          <p:pic>
+            <p:nvPicPr>
+              <p:cNvPr id="13" name="Picture 12">
+                <a:extLst>
+                  <a:ext uri="{FF2B5EF4-FFF2-40B4-BE49-F238E27FC236}">
+                    <a16:creationId xmlns:a16="http://schemas.microsoft.com/office/drawing/2014/main" id="{FEC98EAE-82ED-4431-A1D9-07B24D819773}"/>
+                  </a:ext>
+                </a:extLst>
+              </p:cNvPr>
+              <p:cNvPicPr>
+                <a:picLocks noChangeAspect="1"/>
+              </p:cNvPicPr>
+              <p:nvPr/>
+            </p:nvPicPr>
+            <p:blipFill rotWithShape="1">
+              <a:blip r:embed="rId2">
+                <a:extLst>
+                  <a:ext uri="{28A0092B-C50C-407E-A947-70E740481C1C}">
+                    <a14:useLocalDpi xmlns:a14="http://schemas.microsoft.com/office/drawing/2010/main" val="0"/>
+                  </a:ext>
+                </a:extLst>
+              </a:blip>
+              <a:srcRect t="10379" r="30970" b="16091"/>
+              <a:stretch/>
+            </p:blipFill>
+            <p:spPr>
+              <a:xfrm>
+                <a:off x="394314" y="514597"/>
+                <a:ext cx="2659615" cy="3147568"/>
+              </a:xfrm>
+              <a:prstGeom prst="rect">
+                <a:avLst/>
+              </a:prstGeom>
+            </p:spPr>
+          </p:pic>
+          <p:pic>
+            <p:nvPicPr>
+              <p:cNvPr id="22" name="Picture 21">
+                <a:extLst>
+                  <a:ext uri="{FF2B5EF4-FFF2-40B4-BE49-F238E27FC236}">
+                    <a16:creationId xmlns:a16="http://schemas.microsoft.com/office/drawing/2014/main" id="{05C37656-0A8A-4A7D-B9ED-62B548CA79AD}"/>
+                  </a:ext>
+                </a:extLst>
+              </p:cNvPr>
+              <p:cNvPicPr>
+                <a:picLocks noChangeAspect="1"/>
+              </p:cNvPicPr>
+              <p:nvPr/>
+            </p:nvPicPr>
+            <p:blipFill rotWithShape="1">
+              <a:blip r:embed="rId2">
+                <a:extLst>
+                  <a:ext uri="{28A0092B-C50C-407E-A947-70E740481C1C}">
+                    <a14:useLocalDpi xmlns:a14="http://schemas.microsoft.com/office/drawing/2010/main" val="0"/>
+                  </a:ext>
+                </a:extLst>
+              </a:blip>
+              <a:srcRect l="11590" t="83423" r="37831" b="12464"/>
+              <a:stretch/>
+            </p:blipFill>
+            <p:spPr>
+              <a:xfrm>
+                <a:off x="760405" y="307741"/>
+                <a:ext cx="2274474" cy="184418"/>
+              </a:xfrm>
+              <a:prstGeom prst="rect">
+                <a:avLst/>
+              </a:prstGeom>
+            </p:spPr>
+          </p:pic>
+          <p:pic>
+            <p:nvPicPr>
+              <p:cNvPr id="25" name="Picture 24">
+                <a:extLst>
+                  <a:ext uri="{FF2B5EF4-FFF2-40B4-BE49-F238E27FC236}">
+                    <a16:creationId xmlns:a16="http://schemas.microsoft.com/office/drawing/2014/main" id="{C2C21475-2331-4D76-BFC1-748840A7D6E5}"/>
+                  </a:ext>
+                </a:extLst>
+              </p:cNvPr>
+              <p:cNvPicPr>
+                <a:picLocks noChangeAspect="1"/>
+              </p:cNvPicPr>
+              <p:nvPr/>
+            </p:nvPicPr>
+            <p:blipFill rotWithShape="1">
+              <a:blip r:embed="rId2">
+                <a:extLst>
+                  <a:ext uri="{28A0092B-C50C-407E-A947-70E740481C1C}">
+                    <a14:useLocalDpi xmlns:a14="http://schemas.microsoft.com/office/drawing/2010/main" val="0"/>
+                  </a:ext>
+                </a:extLst>
+              </a:blip>
+              <a:srcRect l="69030" t="25349" r="249" b="32084"/>
+              <a:stretch/>
+            </p:blipFill>
+            <p:spPr>
+              <a:xfrm>
+                <a:off x="983230" y="3703051"/>
+                <a:ext cx="1442452" cy="1992557"/>
+              </a:xfrm>
+              <a:prstGeom prst="rect">
+                <a:avLst/>
+              </a:prstGeom>
+            </p:spPr>
+          </p:pic>
+        </p:grpSp>
+        <p:grpSp>
+          <p:nvGrpSpPr>
+            <p:cNvPr id="43" name="Group 42">
+              <a:extLst>
+                <a:ext uri="{FF2B5EF4-FFF2-40B4-BE49-F238E27FC236}">
+                  <a16:creationId xmlns:a16="http://schemas.microsoft.com/office/drawing/2014/main" id="{5B3827D7-946B-4AE0-8B91-D75B134E7ECA}"/>
+                </a:ext>
+              </a:extLst>
+            </p:cNvPr>
+            <p:cNvGrpSpPr/>
+            <p:nvPr/>
+          </p:nvGrpSpPr>
+          <p:grpSpPr>
+            <a:xfrm>
+              <a:off x="632443" y="284090"/>
+              <a:ext cx="2498107" cy="5449607"/>
+              <a:chOff x="6120352" y="295814"/>
+              <a:chExt cx="2498107" cy="5449607"/>
+            </a:xfrm>
+          </p:grpSpPr>
+          <p:pic>
+            <p:nvPicPr>
+              <p:cNvPr id="15" name="Picture 14">
+                <a:extLst>
+                  <a:ext uri="{FF2B5EF4-FFF2-40B4-BE49-F238E27FC236}">
+                    <a16:creationId xmlns:a16="http://schemas.microsoft.com/office/drawing/2014/main" id="{3DDF6C69-E224-410C-BCEC-CA36B0C0D22D}"/>
+                  </a:ext>
+                </a:extLst>
+              </p:cNvPr>
+              <p:cNvPicPr>
+                <a:picLocks noChangeAspect="1"/>
+              </p:cNvPicPr>
+              <p:nvPr/>
+            </p:nvPicPr>
+            <p:blipFill rotWithShape="1">
+              <a:blip r:embed="rId3">
+                <a:extLst>
+                  <a:ext uri="{28A0092B-C50C-407E-A947-70E740481C1C}">
+                    <a14:useLocalDpi xmlns:a14="http://schemas.microsoft.com/office/drawing/2010/main" val="0"/>
+                  </a:ext>
+                </a:extLst>
+              </a:blip>
+              <a:srcRect l="-2" t="10499" r="35965" b="17057"/>
+              <a:stretch/>
+            </p:blipFill>
+            <p:spPr>
+              <a:xfrm>
+                <a:off x="6120352" y="526309"/>
+                <a:ext cx="2498107" cy="3094969"/>
+              </a:xfrm>
+              <a:prstGeom prst="rect">
+                <a:avLst/>
+              </a:prstGeom>
+            </p:spPr>
+          </p:pic>
+          <p:pic>
+            <p:nvPicPr>
+              <p:cNvPr id="24" name="Picture 23">
+                <a:extLst>
+                  <a:ext uri="{FF2B5EF4-FFF2-40B4-BE49-F238E27FC236}">
+                    <a16:creationId xmlns:a16="http://schemas.microsoft.com/office/drawing/2014/main" id="{C349F950-B5D6-4B2B-8DA3-41B285CC4AD5}"/>
+                  </a:ext>
+                </a:extLst>
+              </p:cNvPr>
+              <p:cNvPicPr>
+                <a:picLocks noChangeAspect="1"/>
+              </p:cNvPicPr>
+              <p:nvPr/>
+            </p:nvPicPr>
+            <p:blipFill rotWithShape="1">
+              <a:blip r:embed="rId3">
+                <a:extLst>
+                  <a:ext uri="{28A0092B-C50C-407E-A947-70E740481C1C}">
+                    <a14:useLocalDpi xmlns:a14="http://schemas.microsoft.com/office/drawing/2010/main" val="0"/>
+                  </a:ext>
+                </a:extLst>
+              </a:blip>
+              <a:srcRect l="13617" t="83519" r="39380" b="12428"/>
+              <a:stretch/>
+            </p:blipFill>
+            <p:spPr>
+              <a:xfrm>
+                <a:off x="6411152" y="295814"/>
+                <a:ext cx="2138723" cy="184419"/>
+              </a:xfrm>
+              <a:prstGeom prst="rect">
+                <a:avLst/>
+              </a:prstGeom>
+            </p:spPr>
+          </p:pic>
+          <p:pic>
+            <p:nvPicPr>
+              <p:cNvPr id="26" name="Picture 25">
+                <a:extLst>
+                  <a:ext uri="{FF2B5EF4-FFF2-40B4-BE49-F238E27FC236}">
+                    <a16:creationId xmlns:a16="http://schemas.microsoft.com/office/drawing/2014/main" id="{43A23D9F-1C7A-4771-A29D-50B4DF5BB6F3}"/>
+                  </a:ext>
+                </a:extLst>
+              </p:cNvPr>
+              <p:cNvPicPr>
+                <a:picLocks noChangeAspect="1"/>
+              </p:cNvPicPr>
+              <p:nvPr/>
+            </p:nvPicPr>
+            <p:blipFill rotWithShape="1">
+              <a:blip r:embed="rId3">
+                <a:extLst>
+                  <a:ext uri="{28A0092B-C50C-407E-A947-70E740481C1C}">
+                    <a14:useLocalDpi xmlns:a14="http://schemas.microsoft.com/office/drawing/2010/main" val="0"/>
+                  </a:ext>
+                </a:extLst>
+              </a:blip>
+              <a:srcRect l="70003" t="25084" r="510" b="30955"/>
+              <a:stretch/>
+            </p:blipFill>
+            <p:spPr>
+              <a:xfrm>
+                <a:off x="6632529" y="3703051"/>
+                <a:ext cx="1385362" cy="2042370"/>
+              </a:xfrm>
+              <a:prstGeom prst="rect">
+                <a:avLst/>
+              </a:prstGeom>
+            </p:spPr>
+          </p:pic>
+        </p:grpSp>
+        <p:grpSp>
+          <p:nvGrpSpPr>
+            <p:cNvPr id="42" name="Group 41">
+              <a:extLst>
+                <a:ext uri="{FF2B5EF4-FFF2-40B4-BE49-F238E27FC236}">
+                  <a16:creationId xmlns:a16="http://schemas.microsoft.com/office/drawing/2014/main" id="{E3CFFB1B-819C-4AF4-93DE-0379CD74715E}"/>
+                </a:ext>
+              </a:extLst>
+            </p:cNvPr>
+            <p:cNvGrpSpPr/>
+            <p:nvPr/>
+          </p:nvGrpSpPr>
+          <p:grpSpPr>
+            <a:xfrm>
+              <a:off x="5917047" y="274396"/>
+              <a:ext cx="2896367" cy="5482161"/>
+              <a:chOff x="3079347" y="277006"/>
+              <a:chExt cx="2896367" cy="5482161"/>
+            </a:xfrm>
+          </p:grpSpPr>
+          <p:pic>
+            <p:nvPicPr>
+              <p:cNvPr id="28" name="Picture 27">
+                <a:extLst>
+                  <a:ext uri="{FF2B5EF4-FFF2-40B4-BE49-F238E27FC236}">
+                    <a16:creationId xmlns:a16="http://schemas.microsoft.com/office/drawing/2014/main" id="{39994C76-F2C0-4611-8BF5-11F0E6A73724}"/>
+                  </a:ext>
+                </a:extLst>
+              </p:cNvPr>
+              <p:cNvPicPr>
+                <a:picLocks noChangeAspect="1"/>
+              </p:cNvPicPr>
+              <p:nvPr/>
+            </p:nvPicPr>
+            <p:blipFill rotWithShape="1">
+              <a:blip r:embed="rId4">
+                <a:extLst>
+                  <a:ext uri="{28A0092B-C50C-407E-A947-70E740481C1C}">
+                    <a14:useLocalDpi xmlns:a14="http://schemas.microsoft.com/office/drawing/2010/main" val="0"/>
+                  </a:ext>
+                </a:extLst>
+              </a:blip>
+              <a:srcRect t="9176" r="29921" b="16329"/>
+              <a:stretch/>
+            </p:blipFill>
+            <p:spPr>
+              <a:xfrm>
+                <a:off x="3079347" y="476311"/>
+                <a:ext cx="2896367" cy="3185854"/>
+              </a:xfrm>
+              <a:prstGeom prst="rect">
+                <a:avLst/>
+              </a:prstGeom>
+            </p:spPr>
+          </p:pic>
+          <p:pic>
+            <p:nvPicPr>
+              <p:cNvPr id="30" name="Picture 29">
+                <a:extLst>
+                  <a:ext uri="{FF2B5EF4-FFF2-40B4-BE49-F238E27FC236}">
+                    <a16:creationId xmlns:a16="http://schemas.microsoft.com/office/drawing/2014/main" id="{5167B724-03BF-4E17-B553-8FB41556B4DB}"/>
+                  </a:ext>
+                </a:extLst>
+              </p:cNvPr>
+              <p:cNvPicPr>
+                <a:picLocks noChangeAspect="1"/>
+              </p:cNvPicPr>
+              <p:nvPr/>
+            </p:nvPicPr>
+            <p:blipFill rotWithShape="1">
+              <a:blip r:embed="rId4">
+                <a:extLst>
+                  <a:ext uri="{28A0092B-C50C-407E-A947-70E740481C1C}">
+                    <a14:useLocalDpi xmlns:a14="http://schemas.microsoft.com/office/drawing/2010/main" val="0"/>
+                  </a:ext>
+                </a:extLst>
+              </a:blip>
+              <a:srcRect l="18303" t="83358" r="49653" b="11860"/>
+              <a:stretch/>
+            </p:blipFill>
+            <p:spPr>
+              <a:xfrm>
+                <a:off x="3851129" y="277006"/>
+                <a:ext cx="1441742" cy="215153"/>
+              </a:xfrm>
+              <a:prstGeom prst="rect">
+                <a:avLst/>
+              </a:prstGeom>
+            </p:spPr>
+          </p:pic>
+          <p:pic>
+            <p:nvPicPr>
+              <p:cNvPr id="33" name="Picture 32">
+                <a:extLst>
+                  <a:ext uri="{FF2B5EF4-FFF2-40B4-BE49-F238E27FC236}">
+                    <a16:creationId xmlns:a16="http://schemas.microsoft.com/office/drawing/2014/main" id="{F089207C-181D-48BF-96CD-C87023F87E3E}"/>
+                  </a:ext>
+                </a:extLst>
+              </p:cNvPr>
+              <p:cNvPicPr>
+                <a:picLocks noChangeAspect="1"/>
+              </p:cNvPicPr>
+              <p:nvPr/>
+            </p:nvPicPr>
+            <p:blipFill rotWithShape="1">
+              <a:blip r:embed="rId5">
+                <a:extLst>
+                  <a:ext uri="{28A0092B-C50C-407E-A947-70E740481C1C}">
+                    <a14:useLocalDpi xmlns:a14="http://schemas.microsoft.com/office/drawing/2010/main" val="0"/>
+                  </a:ext>
+                </a:extLst>
+              </a:blip>
+              <a:srcRect l="69103" t="25055" b="30505"/>
+              <a:stretch/>
+            </p:blipFill>
+            <p:spPr>
+              <a:xfrm>
+                <a:off x="3879319" y="3695430"/>
+                <a:ext cx="1434852" cy="2063737"/>
+              </a:xfrm>
+              <a:prstGeom prst="rect">
+                <a:avLst/>
+              </a:prstGeom>
+            </p:spPr>
+          </p:pic>
+        </p:grpSp>
+        <p:cxnSp>
+          <p:nvCxnSpPr>
+            <p:cNvPr id="39" name="Straight Connector 38">
+              <a:extLst>
+                <a:ext uri="{FF2B5EF4-FFF2-40B4-BE49-F238E27FC236}">
+                  <a16:creationId xmlns:a16="http://schemas.microsoft.com/office/drawing/2014/main" id="{74E76672-A25B-4306-A594-4FDD56FCCC1B}"/>
+                </a:ext>
+              </a:extLst>
+            </p:cNvPr>
+            <p:cNvCxnSpPr>
+              <a:cxnSpLocks/>
+            </p:cNvCxnSpPr>
+            <p:nvPr/>
+          </p:nvCxnSpPr>
+          <p:spPr>
+            <a:xfrm>
+              <a:off x="1144620" y="4528185"/>
+              <a:ext cx="6985951" cy="0"/>
+            </a:xfrm>
+            <a:prstGeom prst="line">
+              <a:avLst/>
+            </a:prstGeom>
+            <a:ln w="9525">
+              <a:solidFill>
+                <a:schemeClr val="tx1">
+                  <a:alpha val="12000"/>
+                </a:schemeClr>
+              </a:solidFill>
+              <a:prstDash val="dash"/>
+            </a:ln>
+          </p:spPr>
+          <p:style>
+            <a:lnRef idx="1">
+              <a:schemeClr val="accent1"/>
+            </a:lnRef>
+            <a:fillRef idx="0">
+              <a:schemeClr val="accent1"/>
+            </a:fillRef>
+            <a:effectRef idx="0">
+              <a:schemeClr val="accent1"/>
+            </a:effectRef>
+            <a:fontRef idx="minor">
+              <a:schemeClr val="tx1"/>
+            </a:fontRef>
+          </p:style>
+        </p:cxnSp>
+        <p:cxnSp>
+          <p:nvCxnSpPr>
+            <p:cNvPr id="52" name="Straight Connector 51">
+              <a:extLst>
+                <a:ext uri="{FF2B5EF4-FFF2-40B4-BE49-F238E27FC236}">
+                  <a16:creationId xmlns:a16="http://schemas.microsoft.com/office/drawing/2014/main" id="{933F2373-76D5-4186-8EAE-1858E2931968}"/>
+                </a:ext>
+              </a:extLst>
+            </p:cNvPr>
+            <p:cNvCxnSpPr>
+              <a:cxnSpLocks/>
+            </p:cNvCxnSpPr>
+            <p:nvPr/>
+          </p:nvCxnSpPr>
+          <p:spPr>
+            <a:xfrm>
+              <a:off x="3098266" y="758303"/>
+              <a:ext cx="343434" cy="242223"/>
+            </a:xfrm>
+            <a:prstGeom prst="line">
+              <a:avLst/>
+            </a:prstGeom>
+            <a:ln w="15875">
+              <a:solidFill>
+                <a:srgbClr val="C00000">
+                  <a:alpha val="54000"/>
+                </a:srgbClr>
+              </a:solidFill>
+              <a:headEnd type="none" w="sm" len="sm"/>
+              <a:tailEnd type="oval" w="sm" len="sm"/>
+            </a:ln>
+          </p:spPr>
+          <p:style>
+            <a:lnRef idx="1">
+              <a:schemeClr val="accent1"/>
+            </a:lnRef>
+            <a:fillRef idx="0">
+              <a:schemeClr val="accent1"/>
+            </a:fillRef>
+            <a:effectRef idx="0">
+              <a:schemeClr val="accent1"/>
+            </a:effectRef>
+            <a:fontRef idx="minor">
+              <a:schemeClr val="tx1"/>
+            </a:fontRef>
+          </p:style>
+        </p:cxnSp>
+        <p:cxnSp>
+          <p:nvCxnSpPr>
+            <p:cNvPr id="53" name="Straight Connector 52">
+              <a:extLst>
+                <a:ext uri="{FF2B5EF4-FFF2-40B4-BE49-F238E27FC236}">
+                  <a16:creationId xmlns:a16="http://schemas.microsoft.com/office/drawing/2014/main" id="{F9DA0F2C-6FDD-40E6-9E2B-52D4F79886EB}"/>
+                </a:ext>
+              </a:extLst>
+            </p:cNvPr>
+            <p:cNvCxnSpPr>
+              <a:cxnSpLocks/>
+            </p:cNvCxnSpPr>
+            <p:nvPr/>
+          </p:nvCxnSpPr>
+          <p:spPr>
+            <a:xfrm>
+              <a:off x="3098266" y="1682761"/>
+              <a:ext cx="343434" cy="723889"/>
+            </a:xfrm>
+            <a:prstGeom prst="line">
+              <a:avLst/>
+            </a:prstGeom>
+            <a:ln w="15875">
+              <a:solidFill>
+                <a:srgbClr val="C00000">
+                  <a:alpha val="54000"/>
+                </a:srgbClr>
+              </a:solidFill>
+              <a:headEnd type="none" w="sm" len="sm"/>
+              <a:tailEnd type="oval" w="sm" len="sm"/>
+            </a:ln>
+          </p:spPr>
+          <p:style>
+            <a:lnRef idx="1">
+              <a:schemeClr val="accent1"/>
+            </a:lnRef>
+            <a:fillRef idx="0">
+              <a:schemeClr val="accent1"/>
+            </a:fillRef>
+            <a:effectRef idx="0">
+              <a:schemeClr val="accent1"/>
+            </a:effectRef>
+            <a:fontRef idx="minor">
+              <a:schemeClr val="tx1"/>
+            </a:fontRef>
+          </p:style>
+        </p:cxnSp>
+        <p:cxnSp>
+          <p:nvCxnSpPr>
+            <p:cNvPr id="55" name="Straight Connector 54">
+              <a:extLst>
+                <a:ext uri="{FF2B5EF4-FFF2-40B4-BE49-F238E27FC236}">
+                  <a16:creationId xmlns:a16="http://schemas.microsoft.com/office/drawing/2014/main" id="{DE0B11C5-193A-4CB5-86B5-2CA8F9AE5CDE}"/>
+                </a:ext>
+              </a:extLst>
+            </p:cNvPr>
+            <p:cNvCxnSpPr>
+              <a:cxnSpLocks/>
+            </p:cNvCxnSpPr>
+            <p:nvPr/>
+          </p:nvCxnSpPr>
+          <p:spPr>
+            <a:xfrm>
+              <a:off x="3098266" y="1927946"/>
+              <a:ext cx="333909" cy="250088"/>
+            </a:xfrm>
+            <a:prstGeom prst="line">
+              <a:avLst/>
+            </a:prstGeom>
+            <a:ln w="15875">
+              <a:solidFill>
+                <a:srgbClr val="C00000">
+                  <a:alpha val="54000"/>
+                </a:srgbClr>
+              </a:solidFill>
+              <a:headEnd type="none" w="sm" len="sm"/>
+              <a:tailEnd type="oval" w="sm" len="sm"/>
+            </a:ln>
+          </p:spPr>
+          <p:style>
+            <a:lnRef idx="1">
+              <a:schemeClr val="accent1"/>
+            </a:lnRef>
+            <a:fillRef idx="0">
+              <a:schemeClr val="accent1"/>
+            </a:fillRef>
+            <a:effectRef idx="0">
+              <a:schemeClr val="accent1"/>
+            </a:effectRef>
+            <a:fontRef idx="minor">
+              <a:schemeClr val="tx1"/>
+            </a:fontRef>
+          </p:style>
+        </p:cxnSp>
+        <p:cxnSp>
+          <p:nvCxnSpPr>
+            <p:cNvPr id="58" name="Straight Connector 57">
+              <a:extLst>
+                <a:ext uri="{FF2B5EF4-FFF2-40B4-BE49-F238E27FC236}">
+                  <a16:creationId xmlns:a16="http://schemas.microsoft.com/office/drawing/2014/main" id="{F5BC5169-F532-43A4-AF56-E4DD676950DD}"/>
+                </a:ext>
+              </a:extLst>
+            </p:cNvPr>
+            <p:cNvCxnSpPr>
+              <a:cxnSpLocks/>
+            </p:cNvCxnSpPr>
+            <p:nvPr/>
+          </p:nvCxnSpPr>
+          <p:spPr>
+            <a:xfrm>
+              <a:off x="3098266" y="2176842"/>
+              <a:ext cx="333909" cy="470350"/>
+            </a:xfrm>
+            <a:prstGeom prst="line">
+              <a:avLst/>
+            </a:prstGeom>
+            <a:ln w="15875">
+              <a:solidFill>
+                <a:srgbClr val="C00000">
+                  <a:alpha val="54000"/>
+                </a:srgbClr>
+              </a:solidFill>
+              <a:headEnd type="none" w="sm" len="sm"/>
+              <a:tailEnd type="oval" w="sm" len="sm"/>
+            </a:ln>
+          </p:spPr>
+          <p:style>
+            <a:lnRef idx="1">
+              <a:schemeClr val="accent1"/>
+            </a:lnRef>
+            <a:fillRef idx="0">
+              <a:schemeClr val="accent1"/>
+            </a:fillRef>
+            <a:effectRef idx="0">
+              <a:schemeClr val="accent1"/>
+            </a:effectRef>
+            <a:fontRef idx="minor">
+              <a:schemeClr val="tx1"/>
+            </a:fontRef>
+          </p:style>
+        </p:cxnSp>
+        <p:cxnSp>
+          <p:nvCxnSpPr>
+            <p:cNvPr id="60" name="Straight Connector 59">
+              <a:extLst>
+                <a:ext uri="{FF2B5EF4-FFF2-40B4-BE49-F238E27FC236}">
+                  <a16:creationId xmlns:a16="http://schemas.microsoft.com/office/drawing/2014/main" id="{314DD3F9-A719-4BAF-9B25-8BBDD7AAB89D}"/>
+                </a:ext>
+              </a:extLst>
+            </p:cNvPr>
+            <p:cNvCxnSpPr>
+              <a:cxnSpLocks/>
+            </p:cNvCxnSpPr>
+            <p:nvPr/>
+          </p:nvCxnSpPr>
+          <p:spPr>
+            <a:xfrm>
+              <a:off x="3098266" y="2401194"/>
+              <a:ext cx="333909" cy="488056"/>
+            </a:xfrm>
+            <a:prstGeom prst="line">
+              <a:avLst/>
+            </a:prstGeom>
+            <a:ln w="15875">
+              <a:solidFill>
+                <a:srgbClr val="C00000">
+                  <a:alpha val="54000"/>
+                </a:srgbClr>
+              </a:solidFill>
+              <a:headEnd type="none" w="sm" len="sm"/>
+              <a:tailEnd type="oval" w="sm" len="sm"/>
+            </a:ln>
+          </p:spPr>
+          <p:style>
+            <a:lnRef idx="1">
+              <a:schemeClr val="accent1"/>
+            </a:lnRef>
+            <a:fillRef idx="0">
+              <a:schemeClr val="accent1"/>
+            </a:fillRef>
+            <a:effectRef idx="0">
+              <a:schemeClr val="accent1"/>
+            </a:effectRef>
+            <a:fontRef idx="minor">
+              <a:schemeClr val="tx1"/>
+            </a:fontRef>
+          </p:style>
+        </p:cxnSp>
+        <p:cxnSp>
+          <p:nvCxnSpPr>
+            <p:cNvPr id="62" name="Straight Connector 61">
+              <a:extLst>
+                <a:ext uri="{FF2B5EF4-FFF2-40B4-BE49-F238E27FC236}">
+                  <a16:creationId xmlns:a16="http://schemas.microsoft.com/office/drawing/2014/main" id="{CBC75B07-CEE9-4844-BD4A-934F2CE22F3C}"/>
+                </a:ext>
+              </a:extLst>
+            </p:cNvPr>
+            <p:cNvCxnSpPr>
+              <a:cxnSpLocks/>
+            </p:cNvCxnSpPr>
+            <p:nvPr/>
+          </p:nvCxnSpPr>
+          <p:spPr>
+            <a:xfrm>
+              <a:off x="3098266" y="2864546"/>
+              <a:ext cx="333909" cy="497145"/>
+            </a:xfrm>
+            <a:prstGeom prst="line">
+              <a:avLst/>
+            </a:prstGeom>
+            <a:ln w="15875">
+              <a:solidFill>
+                <a:srgbClr val="C00000">
+                  <a:alpha val="54000"/>
+                </a:srgbClr>
+              </a:solidFill>
+              <a:headEnd type="none" w="sm" len="sm"/>
+              <a:tailEnd type="oval" w="sm" len="sm"/>
+            </a:ln>
+          </p:spPr>
+          <p:style>
+            <a:lnRef idx="1">
+              <a:schemeClr val="accent1"/>
+            </a:lnRef>
+            <a:fillRef idx="0">
+              <a:schemeClr val="accent1"/>
+            </a:fillRef>
+            <a:effectRef idx="0">
+              <a:schemeClr val="accent1"/>
+            </a:effectRef>
+            <a:fontRef idx="minor">
+              <a:schemeClr val="tx1"/>
+            </a:fontRef>
+          </p:style>
+        </p:cxnSp>
+        <p:cxnSp>
+          <p:nvCxnSpPr>
+            <p:cNvPr id="65" name="Straight Connector 64">
+              <a:extLst>
+                <a:ext uri="{FF2B5EF4-FFF2-40B4-BE49-F238E27FC236}">
+                  <a16:creationId xmlns:a16="http://schemas.microsoft.com/office/drawing/2014/main" id="{C886160B-CDB9-49B2-9A44-1A4941886AD6}"/>
+                </a:ext>
+              </a:extLst>
+            </p:cNvPr>
+            <p:cNvCxnSpPr>
+              <a:cxnSpLocks/>
+            </p:cNvCxnSpPr>
+            <p:nvPr/>
+          </p:nvCxnSpPr>
+          <p:spPr>
+            <a:xfrm flipV="1">
+              <a:off x="3098266" y="773655"/>
+              <a:ext cx="333909" cy="226872"/>
+            </a:xfrm>
+            <a:prstGeom prst="line">
+              <a:avLst/>
+            </a:prstGeom>
+            <a:ln w="15875">
+              <a:solidFill>
+                <a:srgbClr val="00D25F">
+                  <a:alpha val="64000"/>
+                </a:srgbClr>
+              </a:solidFill>
+              <a:headEnd type="none" w="sm" len="sm"/>
+              <a:tailEnd type="oval" w="sm" len="sm"/>
+            </a:ln>
+          </p:spPr>
+          <p:style>
+            <a:lnRef idx="1">
+              <a:schemeClr val="accent1"/>
+            </a:lnRef>
+            <a:fillRef idx="0">
+              <a:schemeClr val="accent1"/>
+            </a:fillRef>
+            <a:effectRef idx="0">
+              <a:schemeClr val="accent1"/>
+            </a:effectRef>
+            <a:fontRef idx="minor">
+              <a:schemeClr val="tx1"/>
+            </a:fontRef>
+          </p:style>
+        </p:cxnSp>
+        <p:cxnSp>
+          <p:nvCxnSpPr>
+            <p:cNvPr id="77" name="Straight Connector 76">
+              <a:extLst>
+                <a:ext uri="{FF2B5EF4-FFF2-40B4-BE49-F238E27FC236}">
+                  <a16:creationId xmlns:a16="http://schemas.microsoft.com/office/drawing/2014/main" id="{37ED1F58-9C4D-49EC-9A1C-2C1B1A4A412A}"/>
+                </a:ext>
+              </a:extLst>
+            </p:cNvPr>
+            <p:cNvCxnSpPr>
+              <a:cxnSpLocks/>
+            </p:cNvCxnSpPr>
+            <p:nvPr/>
+          </p:nvCxnSpPr>
+          <p:spPr>
+            <a:xfrm flipV="1">
+              <a:off x="3121025" y="1701073"/>
+              <a:ext cx="303361" cy="1405531"/>
+            </a:xfrm>
+            <a:prstGeom prst="line">
+              <a:avLst/>
+            </a:prstGeom>
+            <a:ln w="15875">
+              <a:solidFill>
+                <a:srgbClr val="00D25F">
+                  <a:alpha val="64000"/>
+                </a:srgbClr>
+              </a:solidFill>
+              <a:headEnd type="none" w="sm" len="sm"/>
+              <a:tailEnd type="oval" w="sm" len="sm"/>
+            </a:ln>
+          </p:spPr>
+          <p:style>
+            <a:lnRef idx="1">
+              <a:schemeClr val="accent1"/>
+            </a:lnRef>
+            <a:fillRef idx="0">
+              <a:schemeClr val="accent1"/>
+            </a:fillRef>
+            <a:effectRef idx="0">
+              <a:schemeClr val="accent1"/>
+            </a:effectRef>
+            <a:fontRef idx="minor">
+              <a:schemeClr val="tx1"/>
+            </a:fontRef>
+          </p:style>
+        </p:cxnSp>
+        <p:cxnSp>
+          <p:nvCxnSpPr>
+            <p:cNvPr id="79" name="Straight Connector 78">
+              <a:extLst>
+                <a:ext uri="{FF2B5EF4-FFF2-40B4-BE49-F238E27FC236}">
+                  <a16:creationId xmlns:a16="http://schemas.microsoft.com/office/drawing/2014/main" id="{399E27B9-4A8A-452C-899B-246E9DA10AE0}"/>
+                </a:ext>
+              </a:extLst>
+            </p:cNvPr>
+            <p:cNvCxnSpPr>
+              <a:cxnSpLocks/>
+            </p:cNvCxnSpPr>
+            <p:nvPr/>
+          </p:nvCxnSpPr>
+          <p:spPr>
+            <a:xfrm flipV="1">
+              <a:off x="3121025" y="1936300"/>
+              <a:ext cx="311150" cy="1397177"/>
+            </a:xfrm>
+            <a:prstGeom prst="line">
+              <a:avLst/>
+            </a:prstGeom>
+            <a:ln w="15875">
+              <a:solidFill>
+                <a:srgbClr val="00D25F">
+                  <a:alpha val="64000"/>
+                </a:srgbClr>
+              </a:solidFill>
+              <a:headEnd type="none" w="sm" len="sm"/>
+              <a:tailEnd type="oval" w="sm" len="sm"/>
+            </a:ln>
+          </p:spPr>
+          <p:style>
+            <a:lnRef idx="1">
+              <a:schemeClr val="accent1"/>
+            </a:lnRef>
+            <a:fillRef idx="0">
+              <a:schemeClr val="accent1"/>
+            </a:fillRef>
+            <a:effectRef idx="0">
+              <a:schemeClr val="accent1"/>
+            </a:effectRef>
+            <a:fontRef idx="minor">
+              <a:schemeClr val="tx1"/>
+            </a:fontRef>
+          </p:style>
+        </p:cxnSp>
+        <p:cxnSp>
+          <p:nvCxnSpPr>
+            <p:cNvPr id="81" name="Straight Connector 80">
+              <a:extLst>
+                <a:ext uri="{FF2B5EF4-FFF2-40B4-BE49-F238E27FC236}">
+                  <a16:creationId xmlns:a16="http://schemas.microsoft.com/office/drawing/2014/main" id="{906FE314-3E14-42D6-82E7-175C4D01F417}"/>
+                </a:ext>
+              </a:extLst>
+            </p:cNvPr>
+            <p:cNvCxnSpPr>
+              <a:cxnSpLocks/>
+            </p:cNvCxnSpPr>
+            <p:nvPr/>
+          </p:nvCxnSpPr>
+          <p:spPr>
+            <a:xfrm>
+              <a:off x="3098266" y="1238534"/>
+              <a:ext cx="333909" cy="1"/>
+            </a:xfrm>
+            <a:prstGeom prst="line">
+              <a:avLst/>
+            </a:prstGeom>
+            <a:ln w="19050">
+              <a:solidFill>
+                <a:schemeClr val="tx1">
+                  <a:lumMod val="65000"/>
+                  <a:lumOff val="35000"/>
+                  <a:alpha val="66000"/>
+                </a:schemeClr>
+              </a:solidFill>
+              <a:headEnd type="none" w="sm" len="sm"/>
+              <a:tailEnd type="oval" w="sm" len="sm"/>
+            </a:ln>
+          </p:spPr>
+          <p:style>
+            <a:lnRef idx="1">
+              <a:schemeClr val="accent1"/>
+            </a:lnRef>
+            <a:fillRef idx="0">
+              <a:schemeClr val="accent1"/>
+            </a:fillRef>
+            <a:effectRef idx="0">
+              <a:schemeClr val="accent1"/>
+            </a:effectRef>
+            <a:fontRef idx="minor">
+              <a:schemeClr val="tx1"/>
+            </a:fontRef>
+          </p:style>
+        </p:cxnSp>
+        <p:cxnSp>
+          <p:nvCxnSpPr>
+            <p:cNvPr id="85" name="Straight Connector 84">
+              <a:extLst>
+                <a:ext uri="{FF2B5EF4-FFF2-40B4-BE49-F238E27FC236}">
+                  <a16:creationId xmlns:a16="http://schemas.microsoft.com/office/drawing/2014/main" id="{2305215E-FC72-4C32-AAB1-4B27BEB7AD9D}"/>
+                </a:ext>
+              </a:extLst>
+            </p:cNvPr>
+            <p:cNvCxnSpPr>
+              <a:cxnSpLocks/>
+            </p:cNvCxnSpPr>
+            <p:nvPr/>
+          </p:nvCxnSpPr>
+          <p:spPr>
+            <a:xfrm>
+              <a:off x="3107791" y="1474199"/>
+              <a:ext cx="333909" cy="1"/>
+            </a:xfrm>
+            <a:prstGeom prst="line">
+              <a:avLst/>
+            </a:prstGeom>
+            <a:ln w="19050">
+              <a:solidFill>
+                <a:schemeClr val="tx1">
+                  <a:lumMod val="65000"/>
+                  <a:lumOff val="35000"/>
+                  <a:alpha val="66000"/>
+                </a:schemeClr>
+              </a:solidFill>
+              <a:headEnd type="none" w="sm" len="sm"/>
+              <a:tailEnd type="oval" w="sm" len="sm"/>
+            </a:ln>
+          </p:spPr>
+          <p:style>
+            <a:lnRef idx="1">
+              <a:schemeClr val="accent1"/>
+            </a:lnRef>
+            <a:fillRef idx="0">
+              <a:schemeClr val="accent1"/>
+            </a:fillRef>
+            <a:effectRef idx="0">
+              <a:schemeClr val="accent1"/>
+            </a:effectRef>
+            <a:fontRef idx="minor">
+              <a:schemeClr val="tx1"/>
+            </a:fontRef>
+          </p:style>
+        </p:cxnSp>
+        <p:cxnSp>
+          <p:nvCxnSpPr>
+            <p:cNvPr id="86" name="Straight Connector 85">
+              <a:extLst>
+                <a:ext uri="{FF2B5EF4-FFF2-40B4-BE49-F238E27FC236}">
+                  <a16:creationId xmlns:a16="http://schemas.microsoft.com/office/drawing/2014/main" id="{B1F33AE2-2579-4B99-84DF-CE470CE6431E}"/>
+                </a:ext>
+              </a:extLst>
+            </p:cNvPr>
+            <p:cNvCxnSpPr>
+              <a:cxnSpLocks/>
+            </p:cNvCxnSpPr>
+            <p:nvPr/>
+          </p:nvCxnSpPr>
+          <p:spPr>
+            <a:xfrm>
+              <a:off x="5785017" y="762452"/>
+              <a:ext cx="343434" cy="242223"/>
+            </a:xfrm>
+            <a:prstGeom prst="line">
+              <a:avLst/>
+            </a:prstGeom>
+            <a:ln w="15875">
+              <a:solidFill>
+                <a:srgbClr val="C00000">
+                  <a:alpha val="54000"/>
+                </a:srgbClr>
+              </a:solidFill>
+              <a:headEnd type="none" w="sm" len="sm"/>
+              <a:tailEnd type="oval" w="sm" len="sm"/>
+            </a:ln>
+          </p:spPr>
+          <p:style>
+            <a:lnRef idx="1">
+              <a:schemeClr val="accent1"/>
+            </a:lnRef>
+            <a:fillRef idx="0">
+              <a:schemeClr val="accent1"/>
+            </a:fillRef>
+            <a:effectRef idx="0">
+              <a:schemeClr val="accent1"/>
+            </a:effectRef>
+            <a:fontRef idx="minor">
+              <a:schemeClr val="tx1"/>
+            </a:fontRef>
+          </p:style>
+        </p:cxnSp>
+        <p:cxnSp>
+          <p:nvCxnSpPr>
+            <p:cNvPr id="87" name="Straight Connector 86">
+              <a:extLst>
+                <a:ext uri="{FF2B5EF4-FFF2-40B4-BE49-F238E27FC236}">
+                  <a16:creationId xmlns:a16="http://schemas.microsoft.com/office/drawing/2014/main" id="{2A997D89-1DB0-4EF0-9799-F63D2AAB1075}"/>
+                </a:ext>
+              </a:extLst>
+            </p:cNvPr>
+            <p:cNvCxnSpPr>
+              <a:cxnSpLocks/>
+            </p:cNvCxnSpPr>
+            <p:nvPr/>
+          </p:nvCxnSpPr>
+          <p:spPr>
+            <a:xfrm flipV="1">
+              <a:off x="5785017" y="777804"/>
+              <a:ext cx="333909" cy="226872"/>
+            </a:xfrm>
+            <a:prstGeom prst="line">
+              <a:avLst/>
+            </a:prstGeom>
+            <a:ln w="15875">
+              <a:solidFill>
+                <a:srgbClr val="00D25F">
+                  <a:alpha val="64000"/>
+                </a:srgbClr>
+              </a:solidFill>
+              <a:headEnd type="none" w="sm" len="sm"/>
+              <a:tailEnd type="oval" w="sm" len="sm"/>
+            </a:ln>
+          </p:spPr>
+          <p:style>
+            <a:lnRef idx="1">
+              <a:schemeClr val="accent1"/>
+            </a:lnRef>
+            <a:fillRef idx="0">
+              <a:schemeClr val="accent1"/>
+            </a:fillRef>
+            <a:effectRef idx="0">
+              <a:schemeClr val="accent1"/>
+            </a:effectRef>
+            <a:fontRef idx="minor">
+              <a:schemeClr val="tx1"/>
+            </a:fontRef>
+          </p:style>
+        </p:cxnSp>
+        <p:cxnSp>
+          <p:nvCxnSpPr>
+            <p:cNvPr id="88" name="Straight Connector 87">
+              <a:extLst>
+                <a:ext uri="{FF2B5EF4-FFF2-40B4-BE49-F238E27FC236}">
+                  <a16:creationId xmlns:a16="http://schemas.microsoft.com/office/drawing/2014/main" id="{38C8D336-DAB1-453A-9121-4FDC8F740AE5}"/>
+                </a:ext>
+              </a:extLst>
+            </p:cNvPr>
+            <p:cNvCxnSpPr>
+              <a:cxnSpLocks/>
+            </p:cNvCxnSpPr>
+            <p:nvPr/>
+          </p:nvCxnSpPr>
+          <p:spPr>
+            <a:xfrm>
+              <a:off x="5782635" y="1238533"/>
+              <a:ext cx="333909" cy="1"/>
+            </a:xfrm>
+            <a:prstGeom prst="line">
+              <a:avLst/>
+            </a:prstGeom>
+            <a:ln w="19050">
+              <a:solidFill>
+                <a:schemeClr val="tx1">
+                  <a:lumMod val="65000"/>
+                  <a:lumOff val="35000"/>
+                  <a:alpha val="66000"/>
+                </a:schemeClr>
+              </a:solidFill>
+              <a:headEnd type="none" w="sm" len="sm"/>
+              <a:tailEnd type="oval" w="sm" len="sm"/>
+            </a:ln>
+          </p:spPr>
+          <p:style>
+            <a:lnRef idx="1">
+              <a:schemeClr val="accent1"/>
+            </a:lnRef>
+            <a:fillRef idx="0">
+              <a:schemeClr val="accent1"/>
+            </a:fillRef>
+            <a:effectRef idx="0">
+              <a:schemeClr val="accent1"/>
+            </a:effectRef>
+            <a:fontRef idx="minor">
+              <a:schemeClr val="tx1"/>
+            </a:fontRef>
+          </p:style>
+        </p:cxnSp>
+        <p:cxnSp>
+          <p:nvCxnSpPr>
+            <p:cNvPr id="89" name="Straight Connector 88">
+              <a:extLst>
+                <a:ext uri="{FF2B5EF4-FFF2-40B4-BE49-F238E27FC236}">
+                  <a16:creationId xmlns:a16="http://schemas.microsoft.com/office/drawing/2014/main" id="{D741FFD7-8A81-4AB9-A751-5177522E844C}"/>
+                </a:ext>
+              </a:extLst>
+            </p:cNvPr>
+            <p:cNvCxnSpPr>
+              <a:cxnSpLocks/>
+            </p:cNvCxnSpPr>
+            <p:nvPr/>
+          </p:nvCxnSpPr>
+          <p:spPr>
+            <a:xfrm>
+              <a:off x="5778260" y="1474772"/>
+              <a:ext cx="333909" cy="1"/>
+            </a:xfrm>
+            <a:prstGeom prst="line">
+              <a:avLst/>
+            </a:prstGeom>
+            <a:ln w="19050">
+              <a:solidFill>
+                <a:schemeClr val="tx1">
+                  <a:lumMod val="65000"/>
+                  <a:lumOff val="35000"/>
+                  <a:alpha val="66000"/>
+                </a:schemeClr>
+              </a:solidFill>
+              <a:headEnd type="none" w="sm" len="sm"/>
+              <a:tailEnd type="oval" w="sm" len="sm"/>
+            </a:ln>
+          </p:spPr>
+          <p:style>
+            <a:lnRef idx="1">
+              <a:schemeClr val="accent1"/>
+            </a:lnRef>
+            <a:fillRef idx="0">
+              <a:schemeClr val="accent1"/>
+            </a:fillRef>
+            <a:effectRef idx="0">
+              <a:schemeClr val="accent1"/>
+            </a:effectRef>
+            <a:fontRef idx="minor">
+              <a:schemeClr val="tx1"/>
+            </a:fontRef>
+          </p:style>
+        </p:cxnSp>
+        <p:cxnSp>
+          <p:nvCxnSpPr>
+            <p:cNvPr id="90" name="Straight Connector 89">
+              <a:extLst>
+                <a:ext uri="{FF2B5EF4-FFF2-40B4-BE49-F238E27FC236}">
+                  <a16:creationId xmlns:a16="http://schemas.microsoft.com/office/drawing/2014/main" id="{E156A61B-AB26-4442-9751-F57EA6778351}"/>
+                </a:ext>
+              </a:extLst>
+            </p:cNvPr>
+            <p:cNvCxnSpPr>
+              <a:cxnSpLocks/>
+            </p:cNvCxnSpPr>
+            <p:nvPr/>
+          </p:nvCxnSpPr>
+          <p:spPr>
+            <a:xfrm>
+              <a:off x="5771116" y="1693698"/>
+              <a:ext cx="343434" cy="723889"/>
+            </a:xfrm>
+            <a:prstGeom prst="line">
+              <a:avLst/>
+            </a:prstGeom>
+            <a:ln w="15875">
+              <a:solidFill>
+                <a:srgbClr val="C00000">
+                  <a:alpha val="54000"/>
+                </a:srgbClr>
+              </a:solidFill>
+              <a:headEnd type="none" w="sm" len="sm"/>
+              <a:tailEnd type="oval" w="sm" len="sm"/>
+            </a:ln>
+          </p:spPr>
+          <p:style>
+            <a:lnRef idx="1">
+              <a:schemeClr val="accent1"/>
+            </a:lnRef>
+            <a:fillRef idx="0">
+              <a:schemeClr val="accent1"/>
+            </a:fillRef>
+            <a:effectRef idx="0">
+              <a:schemeClr val="accent1"/>
+            </a:effectRef>
+            <a:fontRef idx="minor">
+              <a:schemeClr val="tx1"/>
+            </a:fontRef>
+          </p:style>
+        </p:cxnSp>
+        <p:cxnSp>
+          <p:nvCxnSpPr>
+            <p:cNvPr id="91" name="Straight Connector 90">
+              <a:extLst>
+                <a:ext uri="{FF2B5EF4-FFF2-40B4-BE49-F238E27FC236}">
+                  <a16:creationId xmlns:a16="http://schemas.microsoft.com/office/drawing/2014/main" id="{AEC70404-9BBE-416F-B4B5-F94A17230685}"/>
+                </a:ext>
+              </a:extLst>
+            </p:cNvPr>
+            <p:cNvCxnSpPr>
+              <a:cxnSpLocks/>
+            </p:cNvCxnSpPr>
+            <p:nvPr/>
+          </p:nvCxnSpPr>
+          <p:spPr>
+            <a:xfrm>
+              <a:off x="5775878" y="1948278"/>
+              <a:ext cx="333909" cy="1"/>
+            </a:xfrm>
+            <a:prstGeom prst="line">
+              <a:avLst/>
+            </a:prstGeom>
+            <a:ln w="19050">
+              <a:solidFill>
+                <a:schemeClr val="tx1">
+                  <a:lumMod val="65000"/>
+                  <a:lumOff val="35000"/>
+                  <a:alpha val="66000"/>
+                </a:schemeClr>
+              </a:solidFill>
+              <a:headEnd type="none" w="sm" len="sm"/>
+              <a:tailEnd type="oval" w="sm" len="sm"/>
+            </a:ln>
+          </p:spPr>
+          <p:style>
+            <a:lnRef idx="1">
+              <a:schemeClr val="accent1"/>
+            </a:lnRef>
+            <a:fillRef idx="0">
+              <a:schemeClr val="accent1"/>
+            </a:fillRef>
+            <a:effectRef idx="0">
+              <a:schemeClr val="accent1"/>
+            </a:effectRef>
+            <a:fontRef idx="minor">
+              <a:schemeClr val="tx1"/>
+            </a:fontRef>
+          </p:style>
+        </p:cxnSp>
+        <p:cxnSp>
+          <p:nvCxnSpPr>
+            <p:cNvPr id="92" name="Straight Connector 91">
+              <a:extLst>
+                <a:ext uri="{FF2B5EF4-FFF2-40B4-BE49-F238E27FC236}">
+                  <a16:creationId xmlns:a16="http://schemas.microsoft.com/office/drawing/2014/main" id="{96D2E5F4-BD06-4279-B9E2-7E28249AA6CA}"/>
+                </a:ext>
+              </a:extLst>
+            </p:cNvPr>
+            <p:cNvCxnSpPr>
+              <a:cxnSpLocks/>
+            </p:cNvCxnSpPr>
+            <p:nvPr/>
+          </p:nvCxnSpPr>
+          <p:spPr>
+            <a:xfrm flipV="1">
+              <a:off x="5780641" y="1712686"/>
+              <a:ext cx="329146" cy="464157"/>
+            </a:xfrm>
+            <a:prstGeom prst="line">
+              <a:avLst/>
+            </a:prstGeom>
+            <a:ln w="15875">
+              <a:solidFill>
+                <a:srgbClr val="00D25F">
+                  <a:alpha val="64000"/>
+                </a:srgbClr>
+              </a:solidFill>
+              <a:headEnd type="none" w="sm" len="sm"/>
+              <a:tailEnd type="oval" w="sm" len="sm"/>
+            </a:ln>
+          </p:spPr>
+          <p:style>
+            <a:lnRef idx="1">
+              <a:schemeClr val="accent1"/>
+            </a:lnRef>
+            <a:fillRef idx="0">
+              <a:schemeClr val="accent1"/>
+            </a:fillRef>
+            <a:effectRef idx="0">
+              <a:schemeClr val="accent1"/>
+            </a:effectRef>
+            <a:fontRef idx="minor">
+              <a:schemeClr val="tx1"/>
+            </a:fontRef>
+          </p:style>
+        </p:cxnSp>
+        <p:cxnSp>
+          <p:nvCxnSpPr>
+            <p:cNvPr id="94" name="Straight Connector 93">
+              <a:extLst>
+                <a:ext uri="{FF2B5EF4-FFF2-40B4-BE49-F238E27FC236}">
+                  <a16:creationId xmlns:a16="http://schemas.microsoft.com/office/drawing/2014/main" id="{0EDC81AB-BD0B-468E-A8EC-A999CC49B961}"/>
+                </a:ext>
+              </a:extLst>
+            </p:cNvPr>
+            <p:cNvCxnSpPr>
+              <a:cxnSpLocks/>
+            </p:cNvCxnSpPr>
+            <p:nvPr/>
+          </p:nvCxnSpPr>
+          <p:spPr>
+            <a:xfrm>
+              <a:off x="5778260" y="3120261"/>
+              <a:ext cx="333909" cy="1"/>
+            </a:xfrm>
+            <a:prstGeom prst="line">
+              <a:avLst/>
+            </a:prstGeom>
+            <a:ln w="19050">
+              <a:solidFill>
+                <a:schemeClr val="tx1">
+                  <a:lumMod val="65000"/>
+                  <a:lumOff val="35000"/>
+                  <a:alpha val="66000"/>
+                </a:schemeClr>
+              </a:solidFill>
+              <a:headEnd type="none" w="sm" len="sm"/>
+              <a:tailEnd type="oval" w="sm" len="sm"/>
+            </a:ln>
+          </p:spPr>
+          <p:style>
+            <a:lnRef idx="1">
+              <a:schemeClr val="accent1"/>
+            </a:lnRef>
+            <a:fillRef idx="0">
+              <a:schemeClr val="accent1"/>
+            </a:fillRef>
+            <a:effectRef idx="0">
+              <a:schemeClr val="accent1"/>
+            </a:effectRef>
+            <a:fontRef idx="minor">
+              <a:schemeClr val="tx1"/>
+            </a:fontRef>
+          </p:style>
+        </p:cxnSp>
+        <p:cxnSp>
+          <p:nvCxnSpPr>
+            <p:cNvPr id="95" name="Straight Connector 94">
+              <a:extLst>
+                <a:ext uri="{FF2B5EF4-FFF2-40B4-BE49-F238E27FC236}">
+                  <a16:creationId xmlns:a16="http://schemas.microsoft.com/office/drawing/2014/main" id="{3AC3D172-E24F-4938-8555-9992A50B12C1}"/>
+                </a:ext>
+              </a:extLst>
+            </p:cNvPr>
+            <p:cNvCxnSpPr>
+              <a:cxnSpLocks/>
+            </p:cNvCxnSpPr>
+            <p:nvPr/>
+          </p:nvCxnSpPr>
+          <p:spPr>
+            <a:xfrm>
+              <a:off x="5780641" y="3355954"/>
+              <a:ext cx="333909" cy="1"/>
+            </a:xfrm>
+            <a:prstGeom prst="line">
+              <a:avLst/>
+            </a:prstGeom>
+            <a:ln w="19050">
+              <a:solidFill>
+                <a:schemeClr val="tx1">
+                  <a:lumMod val="65000"/>
+                  <a:lumOff val="35000"/>
+                  <a:alpha val="66000"/>
+                </a:schemeClr>
+              </a:solidFill>
+              <a:headEnd type="none" w="sm" len="sm"/>
+              <a:tailEnd type="oval" w="sm" len="sm"/>
+            </a:ln>
+          </p:spPr>
+          <p:style>
+            <a:lnRef idx="1">
+              <a:schemeClr val="accent1"/>
+            </a:lnRef>
+            <a:fillRef idx="0">
+              <a:schemeClr val="accent1"/>
+            </a:fillRef>
+            <a:effectRef idx="0">
+              <a:schemeClr val="accent1"/>
+            </a:effectRef>
+            <a:fontRef idx="minor">
+              <a:schemeClr val="tx1"/>
+            </a:fontRef>
+          </p:style>
+        </p:cxnSp>
+        <p:cxnSp>
+          <p:nvCxnSpPr>
+            <p:cNvPr id="96" name="Straight Connector 95">
+              <a:extLst>
+                <a:ext uri="{FF2B5EF4-FFF2-40B4-BE49-F238E27FC236}">
+                  <a16:creationId xmlns:a16="http://schemas.microsoft.com/office/drawing/2014/main" id="{CE342410-359A-4D16-9491-C9C3C3A4F8BF}"/>
+                </a:ext>
+              </a:extLst>
+            </p:cNvPr>
+            <p:cNvCxnSpPr>
+              <a:cxnSpLocks/>
+            </p:cNvCxnSpPr>
+            <p:nvPr/>
+          </p:nvCxnSpPr>
+          <p:spPr>
+            <a:xfrm flipV="1">
+              <a:off x="5774882" y="2192490"/>
+              <a:ext cx="326433" cy="454703"/>
+            </a:xfrm>
+            <a:prstGeom prst="line">
+              <a:avLst/>
+            </a:prstGeom>
+            <a:ln w="15875">
+              <a:solidFill>
+                <a:srgbClr val="00D25F">
+                  <a:alpha val="64000"/>
+                </a:srgbClr>
+              </a:solidFill>
+              <a:headEnd type="none" w="sm" len="sm"/>
+              <a:tailEnd type="oval" w="sm" len="sm"/>
+            </a:ln>
+          </p:spPr>
+          <p:style>
+            <a:lnRef idx="1">
+              <a:schemeClr val="accent1"/>
+            </a:lnRef>
+            <a:fillRef idx="0">
+              <a:schemeClr val="accent1"/>
+            </a:fillRef>
+            <a:effectRef idx="0">
+              <a:schemeClr val="accent1"/>
+            </a:effectRef>
+            <a:fontRef idx="minor">
+              <a:schemeClr val="tx1"/>
+            </a:fontRef>
+          </p:style>
+        </p:cxnSp>
+        <p:cxnSp>
+          <p:nvCxnSpPr>
+            <p:cNvPr id="97" name="Straight Connector 96">
+              <a:extLst>
+                <a:ext uri="{FF2B5EF4-FFF2-40B4-BE49-F238E27FC236}">
+                  <a16:creationId xmlns:a16="http://schemas.microsoft.com/office/drawing/2014/main" id="{23C184A3-8C09-4E38-8E86-0CDF4750DA83}"/>
+                </a:ext>
+              </a:extLst>
+            </p:cNvPr>
+            <p:cNvCxnSpPr>
+              <a:cxnSpLocks/>
+            </p:cNvCxnSpPr>
+            <p:nvPr/>
+          </p:nvCxnSpPr>
+          <p:spPr>
+            <a:xfrm>
+              <a:off x="5784407" y="2413910"/>
+              <a:ext cx="316908" cy="466057"/>
+            </a:xfrm>
+            <a:prstGeom prst="line">
+              <a:avLst/>
+            </a:prstGeom>
+            <a:ln w="15875">
+              <a:solidFill>
+                <a:srgbClr val="C00000">
+                  <a:alpha val="54000"/>
+                </a:srgbClr>
+              </a:solidFill>
+              <a:headEnd type="none" w="sm" len="sm"/>
+              <a:tailEnd type="oval" w="sm" len="sm"/>
+            </a:ln>
+          </p:spPr>
+          <p:style>
+            <a:lnRef idx="1">
+              <a:schemeClr val="accent1"/>
+            </a:lnRef>
+            <a:fillRef idx="0">
+              <a:schemeClr val="accent1"/>
+            </a:fillRef>
+            <a:effectRef idx="0">
+              <a:schemeClr val="accent1"/>
+            </a:effectRef>
+            <a:fontRef idx="minor">
+              <a:schemeClr val="tx1"/>
+            </a:fontRef>
+          </p:style>
+        </p:cxnSp>
+        <p:cxnSp>
+          <p:nvCxnSpPr>
+            <p:cNvPr id="99" name="Straight Connector 98">
+              <a:extLst>
+                <a:ext uri="{FF2B5EF4-FFF2-40B4-BE49-F238E27FC236}">
+                  <a16:creationId xmlns:a16="http://schemas.microsoft.com/office/drawing/2014/main" id="{76938B68-F218-461A-8A1A-BDAC238E7DB8}"/>
+                </a:ext>
+              </a:extLst>
+            </p:cNvPr>
+            <p:cNvCxnSpPr>
+              <a:cxnSpLocks/>
+            </p:cNvCxnSpPr>
+            <p:nvPr/>
+          </p:nvCxnSpPr>
+          <p:spPr>
+            <a:xfrm flipV="1">
+              <a:off x="5785016" y="2656745"/>
+              <a:ext cx="324771" cy="223598"/>
+            </a:xfrm>
+            <a:prstGeom prst="line">
+              <a:avLst/>
+            </a:prstGeom>
+            <a:ln w="15875">
+              <a:solidFill>
+                <a:srgbClr val="00D25F">
+                  <a:alpha val="64000"/>
+                </a:srgbClr>
+              </a:solidFill>
+              <a:headEnd type="none" w="sm" len="sm"/>
+              <a:tailEnd type="oval" w="sm" len="sm"/>
+            </a:ln>
+          </p:spPr>
+          <p:style>
+            <a:lnRef idx="1">
+              <a:schemeClr val="accent1"/>
+            </a:lnRef>
+            <a:fillRef idx="0">
+              <a:schemeClr val="accent1"/>
+            </a:fillRef>
+            <a:effectRef idx="0">
+              <a:schemeClr val="accent1"/>
+            </a:effectRef>
+            <a:fontRef idx="minor">
+              <a:schemeClr val="tx1"/>
+            </a:fontRef>
+          </p:style>
+        </p:cxnSp>
+        <p:cxnSp>
+          <p:nvCxnSpPr>
+            <p:cNvPr id="109" name="Straight Connector 108">
+              <a:extLst>
+                <a:ext uri="{FF2B5EF4-FFF2-40B4-BE49-F238E27FC236}">
+                  <a16:creationId xmlns:a16="http://schemas.microsoft.com/office/drawing/2014/main" id="{5266F8A7-3AC8-4322-B329-8DDE3391E2E6}"/>
+                </a:ext>
+              </a:extLst>
+            </p:cNvPr>
+            <p:cNvCxnSpPr>
+              <a:cxnSpLocks/>
+            </p:cNvCxnSpPr>
+            <p:nvPr/>
+          </p:nvCxnSpPr>
+          <p:spPr>
+            <a:xfrm>
+              <a:off x="3104764" y="2639517"/>
+              <a:ext cx="336936" cy="473601"/>
+            </a:xfrm>
+            <a:prstGeom prst="line">
+              <a:avLst/>
+            </a:prstGeom>
+            <a:ln w="15875">
+              <a:solidFill>
+                <a:srgbClr val="C00000">
+                  <a:alpha val="54000"/>
+                </a:srgbClr>
+              </a:solidFill>
+              <a:headEnd type="none" w="sm" len="sm"/>
+              <a:tailEnd type="oval" w="sm" len="sm"/>
+            </a:ln>
+          </p:spPr>
+          <p:style>
+            <a:lnRef idx="1">
+              <a:schemeClr val="accent1"/>
+            </a:lnRef>
+            <a:fillRef idx="0">
+              <a:schemeClr val="accent1"/>
+            </a:fillRef>
+            <a:effectRef idx="0">
+              <a:schemeClr val="accent1"/>
+            </a:effectRef>
+            <a:fontRef idx="minor">
+              <a:schemeClr val="tx1"/>
+            </a:fontRef>
+          </p:style>
+        </p:cxnSp>
+      </p:grpSp>
+    </p:spTree>
+    <p:extLst>
+      <p:ext uri="{BB962C8B-B14F-4D97-AF65-F5344CB8AC3E}">
+        <p14:creationId xmlns:p14="http://schemas.microsoft.com/office/powerpoint/2010/main" val="2048015678"/>
+      </p:ext>
+    </p:extLst>
+  </p:cSld>
+  <p:clrMapOvr>
+    <a:masterClrMapping/>
+  </p:clrMapOvr>
+</p:sld>
+</file>
+
 <file path=ppt/theme/theme1.xml><?xml version="1.0" encoding="utf-8"?>
 <a:theme xmlns:a="http://schemas.openxmlformats.org/drawingml/2006/main" name="Office Theme">
   <a:themeElements>

</xml_diff>

<commit_message>
updated dashboard directory, ppt slides
</commit_message>
<xml_diff>
--- a/report figures/Report Figures.pptx
+++ b/report figures/Report Figures.pptx
@@ -6,7 +6,9 @@
   </p:sldMasterIdLst>
   <p:sldIdLst>
     <p:sldId id="256" r:id="rId2"/>
-    <p:sldId id="257" r:id="rId3"/>
+    <p:sldId id="258" r:id="rId3"/>
+    <p:sldId id="259" r:id="rId4"/>
+    <p:sldId id="257" r:id="rId5"/>
   </p:sldIdLst>
   <p:sldSz cx="9144000" cy="5778500"/>
   <p:notesSz cx="6858000" cy="9144000"/>
@@ -244,7 +246,7 @@
           <a:p>
             <a:fld id="{718910AF-CCB0-4109-9629-38C5E7620F56}" type="datetimeFigureOut">
               <a:rPr lang="en-CA" smtClean="0"/>
-              <a:t>2021-06-18</a:t>
+              <a:t>2021-06-22</a:t>
             </a:fld>
             <a:endParaRPr lang="en-CA"/>
           </a:p>
@@ -414,7 +416,7 @@
           <a:p>
             <a:fld id="{718910AF-CCB0-4109-9629-38C5E7620F56}" type="datetimeFigureOut">
               <a:rPr lang="en-CA" smtClean="0"/>
-              <a:t>2021-06-18</a:t>
+              <a:t>2021-06-22</a:t>
             </a:fld>
             <a:endParaRPr lang="en-CA"/>
           </a:p>
@@ -594,7 +596,7 @@
           <a:p>
             <a:fld id="{718910AF-CCB0-4109-9629-38C5E7620F56}" type="datetimeFigureOut">
               <a:rPr lang="en-CA" smtClean="0"/>
-              <a:t>2021-06-18</a:t>
+              <a:t>2021-06-22</a:t>
             </a:fld>
             <a:endParaRPr lang="en-CA"/>
           </a:p>
@@ -764,7 +766,7 @@
           <a:p>
             <a:fld id="{718910AF-CCB0-4109-9629-38C5E7620F56}" type="datetimeFigureOut">
               <a:rPr lang="en-CA" smtClean="0"/>
-              <a:t>2021-06-18</a:t>
+              <a:t>2021-06-22</a:t>
             </a:fld>
             <a:endParaRPr lang="en-CA"/>
           </a:p>
@@ -1010,7 +1012,7 @@
           <a:p>
             <a:fld id="{718910AF-CCB0-4109-9629-38C5E7620F56}" type="datetimeFigureOut">
               <a:rPr lang="en-CA" smtClean="0"/>
-              <a:t>2021-06-18</a:t>
+              <a:t>2021-06-22</a:t>
             </a:fld>
             <a:endParaRPr lang="en-CA"/>
           </a:p>
@@ -1242,7 +1244,7 @@
           <a:p>
             <a:fld id="{718910AF-CCB0-4109-9629-38C5E7620F56}" type="datetimeFigureOut">
               <a:rPr lang="en-CA" smtClean="0"/>
-              <a:t>2021-06-18</a:t>
+              <a:t>2021-06-22</a:t>
             </a:fld>
             <a:endParaRPr lang="en-CA"/>
           </a:p>
@@ -1609,7 +1611,7 @@
           <a:p>
             <a:fld id="{718910AF-CCB0-4109-9629-38C5E7620F56}" type="datetimeFigureOut">
               <a:rPr lang="en-CA" smtClean="0"/>
-              <a:t>2021-06-18</a:t>
+              <a:t>2021-06-22</a:t>
             </a:fld>
             <a:endParaRPr lang="en-CA"/>
           </a:p>
@@ -1727,7 +1729,7 @@
           <a:p>
             <a:fld id="{718910AF-CCB0-4109-9629-38C5E7620F56}" type="datetimeFigureOut">
               <a:rPr lang="en-CA" smtClean="0"/>
-              <a:t>2021-06-18</a:t>
+              <a:t>2021-06-22</a:t>
             </a:fld>
             <a:endParaRPr lang="en-CA"/>
           </a:p>
@@ -1822,7 +1824,7 @@
           <a:p>
             <a:fld id="{718910AF-CCB0-4109-9629-38C5E7620F56}" type="datetimeFigureOut">
               <a:rPr lang="en-CA" smtClean="0"/>
-              <a:t>2021-06-18</a:t>
+              <a:t>2021-06-22</a:t>
             </a:fld>
             <a:endParaRPr lang="en-CA"/>
           </a:p>
@@ -2099,7 +2101,7 @@
           <a:p>
             <a:fld id="{718910AF-CCB0-4109-9629-38C5E7620F56}" type="datetimeFigureOut">
               <a:rPr lang="en-CA" smtClean="0"/>
-              <a:t>2021-06-18</a:t>
+              <a:t>2021-06-22</a:t>
             </a:fld>
             <a:endParaRPr lang="en-CA"/>
           </a:p>
@@ -2356,7 +2358,7 @@
           <a:p>
             <a:fld id="{718910AF-CCB0-4109-9629-38C5E7620F56}" type="datetimeFigureOut">
               <a:rPr lang="en-CA" smtClean="0"/>
-              <a:t>2021-06-18</a:t>
+              <a:t>2021-06-22</a:t>
             </a:fld>
             <a:endParaRPr lang="en-CA"/>
           </a:p>
@@ -2569,7 +2571,7 @@
           <a:p>
             <a:fld id="{718910AF-CCB0-4109-9629-38C5E7620F56}" type="datetimeFigureOut">
               <a:rPr lang="en-CA" smtClean="0"/>
-              <a:t>2021-06-18</a:t>
+              <a:t>2021-06-22</a:t>
             </a:fld>
             <a:endParaRPr lang="en-CA"/>
           </a:p>
@@ -3465,6 +3467,799 @@
           <a:chExt cx="0" cy="0"/>
         </a:xfrm>
       </p:grpSpPr>
+      <p:pic>
+        <p:nvPicPr>
+          <p:cNvPr id="2050" name="Picture 2">
+            <a:extLst>
+              <a:ext uri="{FF2B5EF4-FFF2-40B4-BE49-F238E27FC236}">
+                <a16:creationId xmlns:a16="http://schemas.microsoft.com/office/drawing/2014/main" id="{D9626E7F-1FD2-4436-8588-9852BE87027A}"/>
+              </a:ext>
+            </a:extLst>
+          </p:cNvPr>
+          <p:cNvPicPr>
+            <a:picLocks noChangeAspect="1" noChangeArrowheads="1"/>
+          </p:cNvPicPr>
+          <p:nvPr/>
+        </p:nvPicPr>
+        <p:blipFill>
+          <a:blip r:embed="rId2">
+            <a:extLst>
+              <a:ext uri="{28A0092B-C50C-407E-A947-70E740481C1C}">
+                <a14:useLocalDpi xmlns:a14="http://schemas.microsoft.com/office/drawing/2010/main" val="0"/>
+              </a:ext>
+            </a:extLst>
+          </a:blip>
+          <a:srcRect/>
+          <a:stretch>
+            <a:fillRect/>
+          </a:stretch>
+        </p:blipFill>
+        <p:spPr bwMode="auto">
+          <a:xfrm>
+            <a:off x="1698385" y="719055"/>
+            <a:ext cx="6368788" cy="4544717"/>
+          </a:xfrm>
+          <a:prstGeom prst="rect">
+            <a:avLst/>
+          </a:prstGeom>
+          <a:noFill/>
+          <a:extLst>
+            <a:ext uri="{909E8E84-426E-40DD-AFC4-6F175D3DCCD1}">
+              <a14:hiddenFill xmlns:a14="http://schemas.microsoft.com/office/drawing/2010/main">
+                <a:solidFill>
+                  <a:srgbClr val="FFFFFF"/>
+                </a:solidFill>
+              </a14:hiddenFill>
+            </a:ext>
+          </a:extLst>
+        </p:spPr>
+      </p:pic>
+      <p:cxnSp>
+        <p:nvCxnSpPr>
+          <p:cNvPr id="5" name="Straight Connector 4">
+            <a:extLst>
+              <a:ext uri="{FF2B5EF4-FFF2-40B4-BE49-F238E27FC236}">
+                <a16:creationId xmlns:a16="http://schemas.microsoft.com/office/drawing/2014/main" id="{60357CD6-2700-4FA9-9CFD-71713088F909}"/>
+              </a:ext>
+            </a:extLst>
+          </p:cNvPr>
+          <p:cNvCxnSpPr/>
+          <p:nvPr/>
+        </p:nvCxnSpPr>
+        <p:spPr>
+          <a:xfrm>
+            <a:off x="3956885" y="1454481"/>
+            <a:ext cx="0" cy="2540168"/>
+          </a:xfrm>
+          <a:prstGeom prst="line">
+            <a:avLst/>
+          </a:prstGeom>
+          <a:ln w="28575">
+            <a:prstDash val="sysDot"/>
+          </a:ln>
+        </p:spPr>
+        <p:style>
+          <a:lnRef idx="1">
+            <a:schemeClr val="dk1"/>
+          </a:lnRef>
+          <a:fillRef idx="0">
+            <a:schemeClr val="dk1"/>
+          </a:fillRef>
+          <a:effectRef idx="0">
+            <a:schemeClr val="dk1"/>
+          </a:effectRef>
+          <a:fontRef idx="minor">
+            <a:schemeClr val="tx1"/>
+          </a:fontRef>
+        </p:style>
+      </p:cxnSp>
+      <p:sp>
+        <p:nvSpPr>
+          <p:cNvPr id="8" name="TextBox 7">
+            <a:extLst>
+              <a:ext uri="{FF2B5EF4-FFF2-40B4-BE49-F238E27FC236}">
+                <a16:creationId xmlns:a16="http://schemas.microsoft.com/office/drawing/2014/main" id="{E05782E7-7821-410B-96D7-1EDA534BFF0F}"/>
+              </a:ext>
+            </a:extLst>
+          </p:cNvPr>
+          <p:cNvSpPr txBox="1"/>
+          <p:nvPr/>
+        </p:nvSpPr>
+        <p:spPr>
+          <a:xfrm>
+            <a:off x="3088919" y="3540323"/>
+            <a:ext cx="862890" cy="300082"/>
+          </a:xfrm>
+          <a:prstGeom prst="rect">
+            <a:avLst/>
+          </a:prstGeom>
+          <a:noFill/>
+        </p:spPr>
+        <p:txBody>
+          <a:bodyPr wrap="square">
+            <a:spAutoFit/>
+          </a:bodyPr>
+          <a:lstStyle/>
+          <a:p>
+            <a:r>
+              <a:rPr lang="en-CA" sz="1350" b="1" dirty="0"/>
+              <a:t>57.9%</a:t>
+            </a:r>
+          </a:p>
+        </p:txBody>
+      </p:sp>
+      <p:sp>
+        <p:nvSpPr>
+          <p:cNvPr id="11" name="TextBox 10">
+            <a:extLst>
+              <a:ext uri="{FF2B5EF4-FFF2-40B4-BE49-F238E27FC236}">
+                <a16:creationId xmlns:a16="http://schemas.microsoft.com/office/drawing/2014/main" id="{AC2F10FA-ABA0-4F1F-894B-5074D30D78C9}"/>
+              </a:ext>
+            </a:extLst>
+          </p:cNvPr>
+          <p:cNvSpPr txBox="1"/>
+          <p:nvPr/>
+        </p:nvSpPr>
+        <p:spPr>
+          <a:xfrm>
+            <a:off x="4190372" y="3540323"/>
+            <a:ext cx="4572752" cy="300082"/>
+          </a:xfrm>
+          <a:prstGeom prst="rect">
+            <a:avLst/>
+          </a:prstGeom>
+          <a:noFill/>
+        </p:spPr>
+        <p:txBody>
+          <a:bodyPr wrap="square">
+            <a:spAutoFit/>
+          </a:bodyPr>
+          <a:lstStyle/>
+          <a:p>
+            <a:r>
+              <a:rPr lang="en-CA" sz="1350" b="1" dirty="0"/>
+              <a:t>42.1%</a:t>
+            </a:r>
+          </a:p>
+        </p:txBody>
+      </p:sp>
+    </p:spTree>
+    <p:extLst>
+      <p:ext uri="{BB962C8B-B14F-4D97-AF65-F5344CB8AC3E}">
+        <p14:creationId xmlns:p14="http://schemas.microsoft.com/office/powerpoint/2010/main" val="4153386418"/>
+      </p:ext>
+    </p:extLst>
+  </p:cSld>
+  <p:clrMapOvr>
+    <a:masterClrMapping/>
+  </p:clrMapOvr>
+</p:sld>
+</file>
+
+<file path=ppt/slides/slide3.xml><?xml version="1.0" encoding="utf-8"?>
+<p:sld xmlns:a="http://schemas.openxmlformats.org/drawingml/2006/main" xmlns:r="http://schemas.openxmlformats.org/officeDocument/2006/relationships" xmlns:p="http://schemas.openxmlformats.org/presentationml/2006/main">
+  <p:cSld>
+    <p:spTree>
+      <p:nvGrpSpPr>
+        <p:cNvPr id="1" name=""/>
+        <p:cNvGrpSpPr/>
+        <p:nvPr/>
+      </p:nvGrpSpPr>
+      <p:grpSpPr>
+        <a:xfrm>
+          <a:off x="0" y="0"/>
+          <a:ext cx="0" cy="0"/>
+          <a:chOff x="0" y="0"/>
+          <a:chExt cx="0" cy="0"/>
+        </a:xfrm>
+      </p:grpSpPr>
+      <p:pic>
+        <p:nvPicPr>
+          <p:cNvPr id="1028" name="Picture 4">
+            <a:extLst>
+              <a:ext uri="{FF2B5EF4-FFF2-40B4-BE49-F238E27FC236}">
+                <a16:creationId xmlns:a16="http://schemas.microsoft.com/office/drawing/2014/main" id="{B0617C74-FF67-4BF8-9DE0-16075ABBB730}"/>
+              </a:ext>
+            </a:extLst>
+          </p:cNvPr>
+          <p:cNvPicPr>
+            <a:picLocks noChangeAspect="1" noChangeArrowheads="1"/>
+          </p:cNvPicPr>
+          <p:nvPr/>
+        </p:nvPicPr>
+        <p:blipFill>
+          <a:blip r:embed="rId2">
+            <a:extLst>
+              <a:ext uri="{28A0092B-C50C-407E-A947-70E740481C1C}">
+                <a14:useLocalDpi xmlns:a14="http://schemas.microsoft.com/office/drawing/2010/main" val="0"/>
+              </a:ext>
+            </a:extLst>
+          </a:blip>
+          <a:srcRect/>
+          <a:stretch>
+            <a:fillRect/>
+          </a:stretch>
+        </p:blipFill>
+        <p:spPr bwMode="auto">
+          <a:xfrm>
+            <a:off x="787300" y="867944"/>
+            <a:ext cx="7814392" cy="4173455"/>
+          </a:xfrm>
+          <a:prstGeom prst="rect">
+            <a:avLst/>
+          </a:prstGeom>
+          <a:noFill/>
+          <a:extLst>
+            <a:ext uri="{909E8E84-426E-40DD-AFC4-6F175D3DCCD1}">
+              <a14:hiddenFill xmlns:a14="http://schemas.microsoft.com/office/drawing/2010/main">
+                <a:solidFill>
+                  <a:srgbClr val="FFFFFF"/>
+                </a:solidFill>
+              </a14:hiddenFill>
+            </a:ext>
+          </a:extLst>
+        </p:spPr>
+      </p:pic>
+      <p:sp>
+        <p:nvSpPr>
+          <p:cNvPr id="4" name="Oval 3">
+            <a:extLst>
+              <a:ext uri="{FF2B5EF4-FFF2-40B4-BE49-F238E27FC236}">
+                <a16:creationId xmlns:a16="http://schemas.microsoft.com/office/drawing/2014/main" id="{A4B76FA6-0939-46F7-A7D9-B7CB027923E8}"/>
+              </a:ext>
+            </a:extLst>
+          </p:cNvPr>
+          <p:cNvSpPr/>
+          <p:nvPr/>
+        </p:nvSpPr>
+        <p:spPr>
+          <a:xfrm>
+            <a:off x="4746459" y="958182"/>
+            <a:ext cx="397042" cy="852738"/>
+          </a:xfrm>
+          <a:prstGeom prst="ellipse">
+            <a:avLst/>
+          </a:prstGeom>
+          <a:noFill/>
+          <a:ln w="57150">
+            <a:solidFill>
+              <a:srgbClr val="66FF66"/>
+            </a:solidFill>
+            <a:prstDash val="solid"/>
+          </a:ln>
+        </p:spPr>
+        <p:style>
+          <a:lnRef idx="2">
+            <a:schemeClr val="accent1">
+              <a:shade val="50000"/>
+            </a:schemeClr>
+          </a:lnRef>
+          <a:fillRef idx="1">
+            <a:schemeClr val="accent1"/>
+          </a:fillRef>
+          <a:effectRef idx="0">
+            <a:schemeClr val="accent1"/>
+          </a:effectRef>
+          <a:fontRef idx="minor">
+            <a:schemeClr val="lt1"/>
+          </a:fontRef>
+        </p:style>
+        <p:txBody>
+          <a:bodyPr rtlCol="0" anchor="ctr"/>
+          <a:lstStyle/>
+          <a:p>
+            <a:pPr algn="ctr"/>
+            <a:endParaRPr lang="en-CA" sz="1350"/>
+          </a:p>
+        </p:txBody>
+      </p:sp>
+      <p:sp>
+        <p:nvSpPr>
+          <p:cNvPr id="7" name="Oval 6">
+            <a:extLst>
+              <a:ext uri="{FF2B5EF4-FFF2-40B4-BE49-F238E27FC236}">
+                <a16:creationId xmlns:a16="http://schemas.microsoft.com/office/drawing/2014/main" id="{1631A274-F608-4050-8FCB-B504AAB8872E}"/>
+              </a:ext>
+            </a:extLst>
+          </p:cNvPr>
+          <p:cNvSpPr/>
+          <p:nvPr/>
+        </p:nvSpPr>
+        <p:spPr>
+          <a:xfrm>
+            <a:off x="787300" y="958182"/>
+            <a:ext cx="397042" cy="852738"/>
+          </a:xfrm>
+          <a:prstGeom prst="ellipse">
+            <a:avLst/>
+          </a:prstGeom>
+          <a:noFill/>
+          <a:ln w="57150">
+            <a:solidFill>
+              <a:srgbClr val="66FF66"/>
+            </a:solidFill>
+            <a:prstDash val="solid"/>
+          </a:ln>
+        </p:spPr>
+        <p:style>
+          <a:lnRef idx="2">
+            <a:schemeClr val="accent1">
+              <a:shade val="50000"/>
+            </a:schemeClr>
+          </a:lnRef>
+          <a:fillRef idx="1">
+            <a:schemeClr val="accent1"/>
+          </a:fillRef>
+          <a:effectRef idx="0">
+            <a:schemeClr val="accent1"/>
+          </a:effectRef>
+          <a:fontRef idx="minor">
+            <a:schemeClr val="lt1"/>
+          </a:fontRef>
+        </p:style>
+        <p:txBody>
+          <a:bodyPr rtlCol="0" anchor="ctr"/>
+          <a:lstStyle/>
+          <a:p>
+            <a:pPr algn="ctr"/>
+            <a:endParaRPr lang="en-CA" sz="1350"/>
+          </a:p>
+        </p:txBody>
+      </p:sp>
+      <p:sp>
+        <p:nvSpPr>
+          <p:cNvPr id="8" name="Oval 7">
+            <a:extLst>
+              <a:ext uri="{FF2B5EF4-FFF2-40B4-BE49-F238E27FC236}">
+                <a16:creationId xmlns:a16="http://schemas.microsoft.com/office/drawing/2014/main" id="{6299CE1A-16E8-445A-83DD-697E5F6C3121}"/>
+              </a:ext>
+            </a:extLst>
+          </p:cNvPr>
+          <p:cNvSpPr/>
+          <p:nvPr/>
+        </p:nvSpPr>
+        <p:spPr>
+          <a:xfrm>
+            <a:off x="1743076" y="3128377"/>
+            <a:ext cx="463215" cy="397042"/>
+          </a:xfrm>
+          <a:prstGeom prst="ellipse">
+            <a:avLst/>
+          </a:prstGeom>
+          <a:noFill/>
+          <a:ln w="57150">
+            <a:solidFill>
+              <a:srgbClr val="66FF66"/>
+            </a:solidFill>
+            <a:prstDash val="solid"/>
+          </a:ln>
+        </p:spPr>
+        <p:style>
+          <a:lnRef idx="2">
+            <a:schemeClr val="accent1">
+              <a:shade val="50000"/>
+            </a:schemeClr>
+          </a:lnRef>
+          <a:fillRef idx="1">
+            <a:schemeClr val="accent1"/>
+          </a:fillRef>
+          <a:effectRef idx="0">
+            <a:schemeClr val="accent1"/>
+          </a:effectRef>
+          <a:fontRef idx="minor">
+            <a:schemeClr val="lt1"/>
+          </a:fontRef>
+        </p:style>
+        <p:txBody>
+          <a:bodyPr rtlCol="0" anchor="ctr"/>
+          <a:lstStyle/>
+          <a:p>
+            <a:pPr algn="ctr"/>
+            <a:endParaRPr lang="en-CA" sz="1350"/>
+          </a:p>
+        </p:txBody>
+      </p:sp>
+      <p:sp>
+        <p:nvSpPr>
+          <p:cNvPr id="9" name="Oval 8">
+            <a:extLst>
+              <a:ext uri="{FF2B5EF4-FFF2-40B4-BE49-F238E27FC236}">
+                <a16:creationId xmlns:a16="http://schemas.microsoft.com/office/drawing/2014/main" id="{A8540EE4-2659-49C7-9F26-9A716BFD0F37}"/>
+              </a:ext>
+            </a:extLst>
+          </p:cNvPr>
+          <p:cNvSpPr/>
+          <p:nvPr/>
+        </p:nvSpPr>
+        <p:spPr>
+          <a:xfrm>
+            <a:off x="5696954" y="3128377"/>
+            <a:ext cx="463215" cy="397042"/>
+          </a:xfrm>
+          <a:prstGeom prst="ellipse">
+            <a:avLst/>
+          </a:prstGeom>
+          <a:noFill/>
+          <a:ln w="57150">
+            <a:solidFill>
+              <a:srgbClr val="66FF66"/>
+            </a:solidFill>
+            <a:prstDash val="solid"/>
+          </a:ln>
+        </p:spPr>
+        <p:style>
+          <a:lnRef idx="2">
+            <a:schemeClr val="accent1">
+              <a:shade val="50000"/>
+            </a:schemeClr>
+          </a:lnRef>
+          <a:fillRef idx="1">
+            <a:schemeClr val="accent1"/>
+          </a:fillRef>
+          <a:effectRef idx="0">
+            <a:schemeClr val="accent1"/>
+          </a:effectRef>
+          <a:fontRef idx="minor">
+            <a:schemeClr val="lt1"/>
+          </a:fontRef>
+        </p:style>
+        <p:txBody>
+          <a:bodyPr rtlCol="0" anchor="ctr"/>
+          <a:lstStyle/>
+          <a:p>
+            <a:pPr algn="ctr"/>
+            <a:endParaRPr lang="en-CA" sz="1350"/>
+          </a:p>
+        </p:txBody>
+      </p:sp>
+      <p:sp>
+        <p:nvSpPr>
+          <p:cNvPr id="10" name="Oval 9">
+            <a:extLst>
+              <a:ext uri="{FF2B5EF4-FFF2-40B4-BE49-F238E27FC236}">
+                <a16:creationId xmlns:a16="http://schemas.microsoft.com/office/drawing/2014/main" id="{1FDA3441-8757-4768-B1FD-3DB9524B0BCD}"/>
+              </a:ext>
+            </a:extLst>
+          </p:cNvPr>
+          <p:cNvSpPr/>
+          <p:nvPr/>
+        </p:nvSpPr>
+        <p:spPr>
+          <a:xfrm>
+            <a:off x="1149017" y="3014830"/>
+            <a:ext cx="412081" cy="227095"/>
+          </a:xfrm>
+          <a:prstGeom prst="ellipse">
+            <a:avLst/>
+          </a:prstGeom>
+          <a:noFill/>
+          <a:ln w="57150">
+            <a:solidFill>
+              <a:srgbClr val="66FF66"/>
+            </a:solidFill>
+            <a:prstDash val="solid"/>
+          </a:ln>
+        </p:spPr>
+        <p:style>
+          <a:lnRef idx="2">
+            <a:schemeClr val="accent1">
+              <a:shade val="50000"/>
+            </a:schemeClr>
+          </a:lnRef>
+          <a:fillRef idx="1">
+            <a:schemeClr val="accent1"/>
+          </a:fillRef>
+          <a:effectRef idx="0">
+            <a:schemeClr val="accent1"/>
+          </a:effectRef>
+          <a:fontRef idx="minor">
+            <a:schemeClr val="lt1"/>
+          </a:fontRef>
+        </p:style>
+        <p:txBody>
+          <a:bodyPr rtlCol="0" anchor="ctr"/>
+          <a:lstStyle/>
+          <a:p>
+            <a:pPr algn="ctr"/>
+            <a:endParaRPr lang="en-CA" sz="1350"/>
+          </a:p>
+        </p:txBody>
+      </p:sp>
+      <p:sp>
+        <p:nvSpPr>
+          <p:cNvPr id="11" name="Oval 10">
+            <a:extLst>
+              <a:ext uri="{FF2B5EF4-FFF2-40B4-BE49-F238E27FC236}">
+                <a16:creationId xmlns:a16="http://schemas.microsoft.com/office/drawing/2014/main" id="{71AA7B6E-5FEB-4629-B241-0834B7ABF21F}"/>
+              </a:ext>
+            </a:extLst>
+          </p:cNvPr>
+          <p:cNvSpPr/>
+          <p:nvPr/>
+        </p:nvSpPr>
+        <p:spPr>
+          <a:xfrm>
+            <a:off x="5188620" y="3014830"/>
+            <a:ext cx="412081" cy="227095"/>
+          </a:xfrm>
+          <a:prstGeom prst="ellipse">
+            <a:avLst/>
+          </a:prstGeom>
+          <a:noFill/>
+          <a:ln w="57150">
+            <a:solidFill>
+              <a:srgbClr val="66FF66"/>
+            </a:solidFill>
+            <a:prstDash val="solid"/>
+          </a:ln>
+        </p:spPr>
+        <p:style>
+          <a:lnRef idx="2">
+            <a:schemeClr val="accent1">
+              <a:shade val="50000"/>
+            </a:schemeClr>
+          </a:lnRef>
+          <a:fillRef idx="1">
+            <a:schemeClr val="accent1"/>
+          </a:fillRef>
+          <a:effectRef idx="0">
+            <a:schemeClr val="accent1"/>
+          </a:effectRef>
+          <a:fontRef idx="minor">
+            <a:schemeClr val="lt1"/>
+          </a:fontRef>
+        </p:style>
+        <p:txBody>
+          <a:bodyPr rtlCol="0" anchor="ctr"/>
+          <a:lstStyle/>
+          <a:p>
+            <a:pPr algn="ctr"/>
+            <a:endParaRPr lang="en-CA" sz="1350"/>
+          </a:p>
+        </p:txBody>
+      </p:sp>
+      <p:sp>
+        <p:nvSpPr>
+          <p:cNvPr id="12" name="Oval 11">
+            <a:extLst>
+              <a:ext uri="{FF2B5EF4-FFF2-40B4-BE49-F238E27FC236}">
+                <a16:creationId xmlns:a16="http://schemas.microsoft.com/office/drawing/2014/main" id="{BA9EB7F8-73EA-4DE1-B418-2137AC98216E}"/>
+              </a:ext>
+            </a:extLst>
+          </p:cNvPr>
+          <p:cNvSpPr/>
+          <p:nvPr/>
+        </p:nvSpPr>
+        <p:spPr>
+          <a:xfrm>
+            <a:off x="3543301" y="3095290"/>
+            <a:ext cx="539916" cy="303798"/>
+          </a:xfrm>
+          <a:prstGeom prst="ellipse">
+            <a:avLst/>
+          </a:prstGeom>
+          <a:noFill/>
+          <a:ln w="57150">
+            <a:solidFill>
+              <a:srgbClr val="66FF66"/>
+            </a:solidFill>
+            <a:prstDash val="solid"/>
+          </a:ln>
+        </p:spPr>
+        <p:style>
+          <a:lnRef idx="2">
+            <a:schemeClr val="accent1">
+              <a:shade val="50000"/>
+            </a:schemeClr>
+          </a:lnRef>
+          <a:fillRef idx="1">
+            <a:schemeClr val="accent1"/>
+          </a:fillRef>
+          <a:effectRef idx="0">
+            <a:schemeClr val="accent1"/>
+          </a:effectRef>
+          <a:fontRef idx="minor">
+            <a:schemeClr val="lt1"/>
+          </a:fontRef>
+        </p:style>
+        <p:txBody>
+          <a:bodyPr rtlCol="0" anchor="ctr"/>
+          <a:lstStyle/>
+          <a:p>
+            <a:pPr algn="ctr"/>
+            <a:endParaRPr lang="en-CA" sz="1350"/>
+          </a:p>
+        </p:txBody>
+      </p:sp>
+      <p:sp>
+        <p:nvSpPr>
+          <p:cNvPr id="13" name="Oval 12">
+            <a:extLst>
+              <a:ext uri="{FF2B5EF4-FFF2-40B4-BE49-F238E27FC236}">
+                <a16:creationId xmlns:a16="http://schemas.microsoft.com/office/drawing/2014/main" id="{D8067C7C-3F76-4217-8A90-40BFB1CE80AE}"/>
+              </a:ext>
+            </a:extLst>
+          </p:cNvPr>
+          <p:cNvSpPr/>
+          <p:nvPr/>
+        </p:nvSpPr>
+        <p:spPr>
+          <a:xfrm>
+            <a:off x="7503947" y="3128376"/>
+            <a:ext cx="539916" cy="303798"/>
+          </a:xfrm>
+          <a:prstGeom prst="ellipse">
+            <a:avLst/>
+          </a:prstGeom>
+          <a:noFill/>
+          <a:ln w="57150">
+            <a:solidFill>
+              <a:srgbClr val="66FF66"/>
+            </a:solidFill>
+            <a:prstDash val="solid"/>
+          </a:ln>
+        </p:spPr>
+        <p:style>
+          <a:lnRef idx="2">
+            <a:schemeClr val="accent1">
+              <a:shade val="50000"/>
+            </a:schemeClr>
+          </a:lnRef>
+          <a:fillRef idx="1">
+            <a:schemeClr val="accent1"/>
+          </a:fillRef>
+          <a:effectRef idx="0">
+            <a:schemeClr val="accent1"/>
+          </a:effectRef>
+          <a:fontRef idx="minor">
+            <a:schemeClr val="lt1"/>
+          </a:fontRef>
+        </p:style>
+        <p:txBody>
+          <a:bodyPr rtlCol="0" anchor="ctr"/>
+          <a:lstStyle/>
+          <a:p>
+            <a:pPr algn="ctr"/>
+            <a:endParaRPr lang="en-CA" sz="1350"/>
+          </a:p>
+        </p:txBody>
+      </p:sp>
+      <p:sp>
+        <p:nvSpPr>
+          <p:cNvPr id="14" name="Oval 13">
+            <a:extLst>
+              <a:ext uri="{FF2B5EF4-FFF2-40B4-BE49-F238E27FC236}">
+                <a16:creationId xmlns:a16="http://schemas.microsoft.com/office/drawing/2014/main" id="{03712CE4-282A-486E-B01E-2F385784BF83}"/>
+              </a:ext>
+            </a:extLst>
+          </p:cNvPr>
+          <p:cNvSpPr/>
+          <p:nvPr/>
+        </p:nvSpPr>
+        <p:spPr>
+          <a:xfrm>
+            <a:off x="2326607" y="2308726"/>
+            <a:ext cx="463215" cy="397042"/>
+          </a:xfrm>
+          <a:prstGeom prst="ellipse">
+            <a:avLst/>
+          </a:prstGeom>
+          <a:noFill/>
+          <a:ln w="57150">
+            <a:solidFill>
+              <a:srgbClr val="66FF66"/>
+            </a:solidFill>
+            <a:prstDash val="solid"/>
+          </a:ln>
+        </p:spPr>
+        <p:style>
+          <a:lnRef idx="2">
+            <a:schemeClr val="accent1">
+              <a:shade val="50000"/>
+            </a:schemeClr>
+          </a:lnRef>
+          <a:fillRef idx="1">
+            <a:schemeClr val="accent1"/>
+          </a:fillRef>
+          <a:effectRef idx="0">
+            <a:schemeClr val="accent1"/>
+          </a:effectRef>
+          <a:fontRef idx="minor">
+            <a:schemeClr val="lt1"/>
+          </a:fontRef>
+        </p:style>
+        <p:txBody>
+          <a:bodyPr rtlCol="0" anchor="ctr"/>
+          <a:lstStyle/>
+          <a:p>
+            <a:pPr algn="ctr"/>
+            <a:endParaRPr lang="en-CA" sz="1350"/>
+          </a:p>
+        </p:txBody>
+      </p:sp>
+      <p:sp>
+        <p:nvSpPr>
+          <p:cNvPr id="15" name="Oval 14">
+            <a:extLst>
+              <a:ext uri="{FF2B5EF4-FFF2-40B4-BE49-F238E27FC236}">
+                <a16:creationId xmlns:a16="http://schemas.microsoft.com/office/drawing/2014/main" id="{A3817350-FDD3-4F3C-AAAE-29D721742329}"/>
+              </a:ext>
+            </a:extLst>
+          </p:cNvPr>
+          <p:cNvSpPr/>
+          <p:nvPr/>
+        </p:nvSpPr>
+        <p:spPr>
+          <a:xfrm>
+            <a:off x="6266949" y="2308726"/>
+            <a:ext cx="463215" cy="397042"/>
+          </a:xfrm>
+          <a:prstGeom prst="ellipse">
+            <a:avLst/>
+          </a:prstGeom>
+          <a:noFill/>
+          <a:ln w="57150">
+            <a:solidFill>
+              <a:srgbClr val="66FF66"/>
+            </a:solidFill>
+            <a:prstDash val="solid"/>
+          </a:ln>
+        </p:spPr>
+        <p:style>
+          <a:lnRef idx="2">
+            <a:schemeClr val="accent1">
+              <a:shade val="50000"/>
+            </a:schemeClr>
+          </a:lnRef>
+          <a:fillRef idx="1">
+            <a:schemeClr val="accent1"/>
+          </a:fillRef>
+          <a:effectRef idx="0">
+            <a:schemeClr val="accent1"/>
+          </a:effectRef>
+          <a:fontRef idx="minor">
+            <a:schemeClr val="lt1"/>
+          </a:fontRef>
+        </p:style>
+        <p:txBody>
+          <a:bodyPr rtlCol="0" anchor="ctr"/>
+          <a:lstStyle/>
+          <a:p>
+            <a:pPr algn="ctr"/>
+            <a:endParaRPr lang="en-CA" sz="1350"/>
+          </a:p>
+        </p:txBody>
+      </p:sp>
+    </p:spTree>
+    <p:extLst>
+      <p:ext uri="{BB962C8B-B14F-4D97-AF65-F5344CB8AC3E}">
+        <p14:creationId xmlns:p14="http://schemas.microsoft.com/office/powerpoint/2010/main" val="3271633948"/>
+      </p:ext>
+    </p:extLst>
+  </p:cSld>
+  <p:clrMapOvr>
+    <a:masterClrMapping/>
+  </p:clrMapOvr>
+</p:sld>
+</file>
+
+<file path=ppt/slides/slide4.xml><?xml version="1.0" encoding="utf-8"?>
+<p:sld xmlns:a="http://schemas.openxmlformats.org/drawingml/2006/main" xmlns:r="http://schemas.openxmlformats.org/officeDocument/2006/relationships" xmlns:p="http://schemas.openxmlformats.org/presentationml/2006/main">
+  <p:cSld>
+    <p:spTree>
+      <p:nvGrpSpPr>
+        <p:cNvPr id="1" name=""/>
+        <p:cNvGrpSpPr/>
+        <p:nvPr/>
+      </p:nvGrpSpPr>
+      <p:grpSpPr>
+        <a:xfrm>
+          <a:off x="0" y="0"/>
+          <a:ext cx="0" cy="0"/>
+          <a:chOff x="0" y="0"/>
+          <a:chExt cx="0" cy="0"/>
+        </a:xfrm>
+      </p:grpSpPr>
       <p:grpSp>
         <p:nvGrpSpPr>
           <p:cNvPr id="111" name="Group 110">

</xml_diff>